<commit_message>
update presentation and behavior space
</commit_message>
<xml_diff>
--- a/Lakeland Presentation.pptx
+++ b/Lakeland Presentation.pptx
@@ -5,17 +5,27 @@
     <p:sldMasterId id="2147483648" r:id="rId1"/>
   </p:sldMasterIdLst>
   <p:notesMasterIdLst>
-    <p:notesMasterId r:id="rId10"/>
+    <p:notesMasterId r:id="rId20"/>
   </p:notesMasterIdLst>
   <p:sldIdLst>
     <p:sldId id="256" r:id="rId2"/>
     <p:sldId id="258" r:id="rId3"/>
     <p:sldId id="265" r:id="rId4"/>
     <p:sldId id="263" r:id="rId5"/>
-    <p:sldId id="266" r:id="rId6"/>
-    <p:sldId id="267" r:id="rId7"/>
-    <p:sldId id="268" r:id="rId8"/>
-    <p:sldId id="269" r:id="rId9"/>
+    <p:sldId id="270" r:id="rId6"/>
+    <p:sldId id="266" r:id="rId7"/>
+    <p:sldId id="271" r:id="rId8"/>
+    <p:sldId id="272" r:id="rId9"/>
+    <p:sldId id="273" r:id="rId10"/>
+    <p:sldId id="274" r:id="rId11"/>
+    <p:sldId id="275" r:id="rId12"/>
+    <p:sldId id="276" r:id="rId13"/>
+    <p:sldId id="267" r:id="rId14"/>
+    <p:sldId id="268" r:id="rId15"/>
+    <p:sldId id="277" r:id="rId16"/>
+    <p:sldId id="278" r:id="rId17"/>
+    <p:sldId id="279" r:id="rId18"/>
+    <p:sldId id="269" r:id="rId19"/>
   </p:sldIdLst>
   <p:sldSz cx="12192000" cy="6858000"/>
   <p:notesSz cx="6858000" cy="9144000"/>
@@ -3414,6 +3424,1083 @@
 </p:sld>
 </file>
 
+<file path=ppt/slides/slide10.xml><?xml version="1.0" encoding="utf-8"?>
+<p:sld xmlns:a="http://schemas.openxmlformats.org/drawingml/2006/main" xmlns:r="http://schemas.openxmlformats.org/officeDocument/2006/relationships" xmlns:p="http://schemas.openxmlformats.org/presentationml/2006/main">
+  <p:cSld>
+    <p:spTree>
+      <p:nvGrpSpPr>
+        <p:cNvPr id="1" name=""/>
+        <p:cNvGrpSpPr/>
+        <p:nvPr/>
+      </p:nvGrpSpPr>
+      <p:grpSpPr>
+        <a:xfrm>
+          <a:off x="0" y="0"/>
+          <a:ext cx="0" cy="0"/>
+          <a:chOff x="0" y="0"/>
+          <a:chExt cx="0" cy="0"/>
+        </a:xfrm>
+      </p:grpSpPr>
+      <p:sp>
+        <p:nvSpPr>
+          <p:cNvPr id="2" name="Title 1"/>
+          <p:cNvSpPr>
+            <a:spLocks noGrp="1"/>
+          </p:cNvSpPr>
+          <p:nvPr>
+            <p:ph type="title"/>
+          </p:nvPr>
+        </p:nvSpPr>
+        <p:spPr/>
+        <p:txBody>
+          <a:bodyPr/>
+          <a:lstStyle/>
+          <a:p>
+            <a:r>
+              <a:rPr lang="en-US" dirty="0" smtClean="0"/>
+              <a:t>Modification 2: Variability in Utility Function</a:t>
+            </a:r>
+            <a:endParaRPr lang="en-US" dirty="0"/>
+          </a:p>
+        </p:txBody>
+      </p:sp>
+      <p:pic>
+        <p:nvPicPr>
+          <p:cNvPr id="4" name="Picture 3"/>
+          <p:cNvPicPr>
+            <a:picLocks noChangeAspect="1"/>
+          </p:cNvPicPr>
+          <p:nvPr/>
+        </p:nvPicPr>
+        <p:blipFill rotWithShape="1">
+          <a:blip r:embed="rId2"/>
+          <a:srcRect l="3901"/>
+          <a:stretch/>
+        </p:blipFill>
+        <p:spPr>
+          <a:xfrm>
+            <a:off x="838200" y="1581504"/>
+            <a:ext cx="4230806" cy="4320095"/>
+          </a:xfrm>
+          <a:prstGeom prst="rect">
+            <a:avLst/>
+          </a:prstGeom>
+        </p:spPr>
+      </p:pic>
+      <p:pic>
+        <p:nvPicPr>
+          <p:cNvPr id="12" name="Picture 11"/>
+          <p:cNvPicPr>
+            <a:picLocks noChangeAspect="1"/>
+          </p:cNvPicPr>
+          <p:nvPr/>
+        </p:nvPicPr>
+        <p:blipFill rotWithShape="1">
+          <a:blip r:embed="rId3"/>
+          <a:srcRect l="2610"/>
+          <a:stretch/>
+        </p:blipFill>
+        <p:spPr>
+          <a:xfrm>
+            <a:off x="838199" y="1657137"/>
+            <a:ext cx="4133669" cy="4244462"/>
+          </a:xfrm>
+          <a:prstGeom prst="rect">
+            <a:avLst/>
+          </a:prstGeom>
+        </p:spPr>
+      </p:pic>
+      <p:sp>
+        <p:nvSpPr>
+          <p:cNvPr id="14" name="TextBox 13"/>
+          <p:cNvSpPr txBox="1"/>
+          <p:nvPr/>
+        </p:nvSpPr>
+        <p:spPr>
+          <a:xfrm>
+            <a:off x="1834486" y="5977232"/>
+            <a:ext cx="2238233" cy="369332"/>
+          </a:xfrm>
+          <a:prstGeom prst="rect">
+            <a:avLst/>
+          </a:prstGeom>
+          <a:noFill/>
+        </p:spPr>
+        <p:txBody>
+          <a:bodyPr wrap="square" rtlCol="0">
+            <a:spAutoFit/>
+          </a:bodyPr>
+          <a:lstStyle/>
+          <a:p>
+            <a:r>
+              <a:rPr lang="en-US" b="1" dirty="0" smtClean="0">
+                <a:solidFill>
+                  <a:schemeClr val="accent1">
+                    <a:lumMod val="75000"/>
+                  </a:schemeClr>
+                </a:solidFill>
+              </a:rPr>
+              <a:t>Fishing</a:t>
+            </a:r>
+            <a:r>
+              <a:rPr lang="en-US" dirty="0" smtClean="0"/>
+              <a:t> &amp; </a:t>
+            </a:r>
+            <a:r>
+              <a:rPr lang="en-US" b="1" dirty="0" smtClean="0">
+                <a:solidFill>
+                  <a:srgbClr val="FFC000"/>
+                </a:solidFill>
+              </a:rPr>
+              <a:t>Mining</a:t>
+            </a:r>
+            <a:endParaRPr lang="en-US" b="1" dirty="0">
+              <a:solidFill>
+                <a:srgbClr val="FFC000"/>
+              </a:solidFill>
+            </a:endParaRPr>
+          </a:p>
+        </p:txBody>
+      </p:sp>
+      <p:pic>
+        <p:nvPicPr>
+          <p:cNvPr id="7" name="Picture 6"/>
+          <p:cNvPicPr>
+            <a:picLocks noChangeAspect="1"/>
+          </p:cNvPicPr>
+          <p:nvPr/>
+        </p:nvPicPr>
+        <p:blipFill rotWithShape="1">
+          <a:blip r:embed="rId4"/>
+          <a:srcRect r="13328"/>
+          <a:stretch/>
+        </p:blipFill>
+        <p:spPr>
+          <a:xfrm>
+            <a:off x="5069006" y="1690688"/>
+            <a:ext cx="4689143" cy="762000"/>
+          </a:xfrm>
+          <a:prstGeom prst="rect">
+            <a:avLst/>
+          </a:prstGeom>
+        </p:spPr>
+      </p:pic>
+      <p:sp>
+        <p:nvSpPr>
+          <p:cNvPr id="15" name="TextBox 14"/>
+          <p:cNvSpPr txBox="1"/>
+          <p:nvPr/>
+        </p:nvSpPr>
+        <p:spPr>
+          <a:xfrm>
+            <a:off x="5201036" y="2462427"/>
+            <a:ext cx="4230806" cy="369332"/>
+          </a:xfrm>
+          <a:prstGeom prst="rect">
+            <a:avLst/>
+          </a:prstGeom>
+          <a:noFill/>
+        </p:spPr>
+        <p:txBody>
+          <a:bodyPr wrap="square" rtlCol="0">
+            <a:spAutoFit/>
+          </a:bodyPr>
+          <a:lstStyle/>
+          <a:p>
+            <a:r>
+              <a:rPr lang="en-US" b="1" dirty="0" smtClean="0"/>
+              <a:t>Before</a:t>
+            </a:r>
+            <a:r>
+              <a:rPr lang="en-US" dirty="0" smtClean="0"/>
+              <a:t>: Vary         but same for all turtles    </a:t>
+            </a:r>
+            <a:endParaRPr lang="en-US" dirty="0"/>
+          </a:p>
+        </p:txBody>
+      </p:sp>
+      <p:pic>
+        <p:nvPicPr>
+          <p:cNvPr id="16" name="Picture 15"/>
+          <p:cNvPicPr>
+            <a:picLocks noChangeAspect="1"/>
+          </p:cNvPicPr>
+          <p:nvPr/>
+        </p:nvPicPr>
+        <p:blipFill rotWithShape="1">
+          <a:blip r:embed="rId5"/>
+          <a:srcRect l="24424" t="20325" r="21845" b="20325"/>
+          <a:stretch/>
+        </p:blipFill>
+        <p:spPr>
+          <a:xfrm>
+            <a:off x="6523631" y="2523982"/>
+            <a:ext cx="272956" cy="307777"/>
+          </a:xfrm>
+          <a:prstGeom prst="rect">
+            <a:avLst/>
+          </a:prstGeom>
+        </p:spPr>
+      </p:pic>
+    </p:spTree>
+    <p:extLst>
+      <p:ext uri="{BB962C8B-B14F-4D97-AF65-F5344CB8AC3E}">
+        <p14:creationId xmlns:p14="http://schemas.microsoft.com/office/powerpoint/2010/main" val="1934441063"/>
+      </p:ext>
+    </p:extLst>
+  </p:cSld>
+  <p:clrMapOvr>
+    <a:masterClrMapping/>
+  </p:clrMapOvr>
+</p:sld>
+</file>
+
+<file path=ppt/slides/slide11.xml><?xml version="1.0" encoding="utf-8"?>
+<p:sld xmlns:a="http://schemas.openxmlformats.org/drawingml/2006/main" xmlns:r="http://schemas.openxmlformats.org/officeDocument/2006/relationships" xmlns:p="http://schemas.openxmlformats.org/presentationml/2006/main">
+  <p:cSld>
+    <p:spTree>
+      <p:nvGrpSpPr>
+        <p:cNvPr id="1" name=""/>
+        <p:cNvGrpSpPr/>
+        <p:nvPr/>
+      </p:nvGrpSpPr>
+      <p:grpSpPr>
+        <a:xfrm>
+          <a:off x="0" y="0"/>
+          <a:ext cx="0" cy="0"/>
+          <a:chOff x="0" y="0"/>
+          <a:chExt cx="0" cy="0"/>
+        </a:xfrm>
+      </p:grpSpPr>
+      <p:sp>
+        <p:nvSpPr>
+          <p:cNvPr id="2" name="Title 1"/>
+          <p:cNvSpPr>
+            <a:spLocks noGrp="1"/>
+          </p:cNvSpPr>
+          <p:nvPr>
+            <p:ph type="title"/>
+          </p:nvPr>
+        </p:nvSpPr>
+        <p:spPr/>
+        <p:txBody>
+          <a:bodyPr/>
+          <a:lstStyle/>
+          <a:p>
+            <a:r>
+              <a:rPr lang="en-US" dirty="0" smtClean="0"/>
+              <a:t>Modification 2: Variability in Utility Function</a:t>
+            </a:r>
+            <a:endParaRPr lang="en-US" dirty="0"/>
+          </a:p>
+        </p:txBody>
+      </p:sp>
+      <p:pic>
+        <p:nvPicPr>
+          <p:cNvPr id="4" name="Picture 3"/>
+          <p:cNvPicPr>
+            <a:picLocks noChangeAspect="1"/>
+          </p:cNvPicPr>
+          <p:nvPr/>
+        </p:nvPicPr>
+        <p:blipFill rotWithShape="1">
+          <a:blip r:embed="rId2"/>
+          <a:srcRect l="3901"/>
+          <a:stretch/>
+        </p:blipFill>
+        <p:spPr>
+          <a:xfrm>
+            <a:off x="838200" y="1581504"/>
+            <a:ext cx="4230806" cy="4320095"/>
+          </a:xfrm>
+          <a:prstGeom prst="rect">
+            <a:avLst/>
+          </a:prstGeom>
+        </p:spPr>
+      </p:pic>
+      <p:pic>
+        <p:nvPicPr>
+          <p:cNvPr id="12" name="Picture 11"/>
+          <p:cNvPicPr>
+            <a:picLocks noChangeAspect="1"/>
+          </p:cNvPicPr>
+          <p:nvPr/>
+        </p:nvPicPr>
+        <p:blipFill rotWithShape="1">
+          <a:blip r:embed="rId3"/>
+          <a:srcRect l="2610"/>
+          <a:stretch/>
+        </p:blipFill>
+        <p:spPr>
+          <a:xfrm>
+            <a:off x="838199" y="1657137"/>
+            <a:ext cx="4133669" cy="4244462"/>
+          </a:xfrm>
+          <a:prstGeom prst="rect">
+            <a:avLst/>
+          </a:prstGeom>
+        </p:spPr>
+      </p:pic>
+      <p:sp>
+        <p:nvSpPr>
+          <p:cNvPr id="14" name="TextBox 13"/>
+          <p:cNvSpPr txBox="1"/>
+          <p:nvPr/>
+        </p:nvSpPr>
+        <p:spPr>
+          <a:xfrm>
+            <a:off x="1834486" y="5977232"/>
+            <a:ext cx="2238233" cy="369332"/>
+          </a:xfrm>
+          <a:prstGeom prst="rect">
+            <a:avLst/>
+          </a:prstGeom>
+          <a:noFill/>
+        </p:spPr>
+        <p:txBody>
+          <a:bodyPr wrap="square" rtlCol="0">
+            <a:spAutoFit/>
+          </a:bodyPr>
+          <a:lstStyle/>
+          <a:p>
+            <a:r>
+              <a:rPr lang="en-US" b="1" dirty="0" smtClean="0">
+                <a:solidFill>
+                  <a:schemeClr val="accent1">
+                    <a:lumMod val="75000"/>
+                  </a:schemeClr>
+                </a:solidFill>
+              </a:rPr>
+              <a:t>Fishing</a:t>
+            </a:r>
+            <a:r>
+              <a:rPr lang="en-US" dirty="0" smtClean="0"/>
+              <a:t> &amp; </a:t>
+            </a:r>
+            <a:r>
+              <a:rPr lang="en-US" b="1" dirty="0" smtClean="0">
+                <a:solidFill>
+                  <a:srgbClr val="FFC000"/>
+                </a:solidFill>
+              </a:rPr>
+              <a:t>Mining</a:t>
+            </a:r>
+            <a:endParaRPr lang="en-US" b="1" dirty="0">
+              <a:solidFill>
+                <a:srgbClr val="FFC000"/>
+              </a:solidFill>
+            </a:endParaRPr>
+          </a:p>
+        </p:txBody>
+      </p:sp>
+      <p:pic>
+        <p:nvPicPr>
+          <p:cNvPr id="7" name="Picture 6"/>
+          <p:cNvPicPr>
+            <a:picLocks noChangeAspect="1"/>
+          </p:cNvPicPr>
+          <p:nvPr/>
+        </p:nvPicPr>
+        <p:blipFill rotWithShape="1">
+          <a:blip r:embed="rId4"/>
+          <a:srcRect r="13328"/>
+          <a:stretch/>
+        </p:blipFill>
+        <p:spPr>
+          <a:xfrm>
+            <a:off x="5069006" y="1690688"/>
+            <a:ext cx="4689143" cy="762000"/>
+          </a:xfrm>
+          <a:prstGeom prst="rect">
+            <a:avLst/>
+          </a:prstGeom>
+        </p:spPr>
+      </p:pic>
+      <p:sp>
+        <p:nvSpPr>
+          <p:cNvPr id="15" name="TextBox 14"/>
+          <p:cNvSpPr txBox="1"/>
+          <p:nvPr/>
+        </p:nvSpPr>
+        <p:spPr>
+          <a:xfrm>
+            <a:off x="5201036" y="2462427"/>
+            <a:ext cx="4230806" cy="369332"/>
+          </a:xfrm>
+          <a:prstGeom prst="rect">
+            <a:avLst/>
+          </a:prstGeom>
+          <a:noFill/>
+        </p:spPr>
+        <p:txBody>
+          <a:bodyPr wrap="square" rtlCol="0">
+            <a:spAutoFit/>
+          </a:bodyPr>
+          <a:lstStyle/>
+          <a:p>
+            <a:r>
+              <a:rPr lang="en-US" b="1" dirty="0" smtClean="0"/>
+              <a:t>Before</a:t>
+            </a:r>
+            <a:r>
+              <a:rPr lang="en-US" dirty="0" smtClean="0"/>
+              <a:t>: Vary         but same for all turtles    </a:t>
+            </a:r>
+            <a:endParaRPr lang="en-US" dirty="0"/>
+          </a:p>
+        </p:txBody>
+      </p:sp>
+      <p:pic>
+        <p:nvPicPr>
+          <p:cNvPr id="16" name="Picture 15"/>
+          <p:cNvPicPr>
+            <a:picLocks noChangeAspect="1"/>
+          </p:cNvPicPr>
+          <p:nvPr/>
+        </p:nvPicPr>
+        <p:blipFill rotWithShape="1">
+          <a:blip r:embed="rId5"/>
+          <a:srcRect l="24424" t="20325" r="21845" b="20325"/>
+          <a:stretch/>
+        </p:blipFill>
+        <p:spPr>
+          <a:xfrm>
+            <a:off x="6523631" y="2523982"/>
+            <a:ext cx="272956" cy="307777"/>
+          </a:xfrm>
+          <a:prstGeom prst="rect">
+            <a:avLst/>
+          </a:prstGeom>
+        </p:spPr>
+      </p:pic>
+      <p:sp>
+        <p:nvSpPr>
+          <p:cNvPr id="3" name="TextBox 2"/>
+          <p:cNvSpPr txBox="1"/>
+          <p:nvPr/>
+        </p:nvSpPr>
+        <p:spPr>
+          <a:xfrm>
+            <a:off x="5201036" y="3230477"/>
+            <a:ext cx="4734534" cy="369332"/>
+          </a:xfrm>
+          <a:prstGeom prst="rect">
+            <a:avLst/>
+          </a:prstGeom>
+          <a:noFill/>
+        </p:spPr>
+        <p:txBody>
+          <a:bodyPr wrap="square" rtlCol="0">
+            <a:spAutoFit/>
+          </a:bodyPr>
+          <a:lstStyle/>
+          <a:p>
+            <a:r>
+              <a:rPr lang="en-US" b="1" dirty="0" smtClean="0"/>
+              <a:t>After: </a:t>
+            </a:r>
+            <a:r>
+              <a:rPr lang="en-US" dirty="0" smtClean="0"/>
+              <a:t>Introduced a switch for variability </a:t>
+            </a:r>
+            <a:endParaRPr lang="en-US" b="1" dirty="0"/>
+          </a:p>
+        </p:txBody>
+      </p:sp>
+      <p:pic>
+        <p:nvPicPr>
+          <p:cNvPr id="6" name="Picture 5"/>
+          <p:cNvPicPr>
+            <a:picLocks noChangeAspect="1"/>
+          </p:cNvPicPr>
+          <p:nvPr/>
+        </p:nvPicPr>
+        <p:blipFill>
+          <a:blip r:embed="rId6"/>
+          <a:stretch>
+            <a:fillRect/>
+          </a:stretch>
+        </p:blipFill>
+        <p:spPr>
+          <a:xfrm>
+            <a:off x="5201036" y="3650093"/>
+            <a:ext cx="3465292" cy="1169184"/>
+          </a:xfrm>
+          <a:prstGeom prst="rect">
+            <a:avLst/>
+          </a:prstGeom>
+        </p:spPr>
+      </p:pic>
+    </p:spTree>
+    <p:extLst>
+      <p:ext uri="{BB962C8B-B14F-4D97-AF65-F5344CB8AC3E}">
+        <p14:creationId xmlns:p14="http://schemas.microsoft.com/office/powerpoint/2010/main" val="159190422"/>
+      </p:ext>
+    </p:extLst>
+  </p:cSld>
+  <p:clrMapOvr>
+    <a:masterClrMapping/>
+  </p:clrMapOvr>
+</p:sld>
+</file>
+
+<file path=ppt/slides/slide12.xml><?xml version="1.0" encoding="utf-8"?>
+<p:sld xmlns:a="http://schemas.openxmlformats.org/drawingml/2006/main" xmlns:r="http://schemas.openxmlformats.org/officeDocument/2006/relationships" xmlns:p="http://schemas.openxmlformats.org/presentationml/2006/main">
+  <p:cSld>
+    <p:spTree>
+      <p:nvGrpSpPr>
+        <p:cNvPr id="1" name=""/>
+        <p:cNvGrpSpPr/>
+        <p:nvPr/>
+      </p:nvGrpSpPr>
+      <p:grpSpPr>
+        <a:xfrm>
+          <a:off x="0" y="0"/>
+          <a:ext cx="0" cy="0"/>
+          <a:chOff x="0" y="0"/>
+          <a:chExt cx="0" cy="0"/>
+        </a:xfrm>
+      </p:grpSpPr>
+      <p:sp>
+        <p:nvSpPr>
+          <p:cNvPr id="2" name="Title 1"/>
+          <p:cNvSpPr>
+            <a:spLocks noGrp="1"/>
+          </p:cNvSpPr>
+          <p:nvPr>
+            <p:ph type="title"/>
+          </p:nvPr>
+        </p:nvSpPr>
+        <p:spPr/>
+        <p:txBody>
+          <a:bodyPr/>
+          <a:lstStyle/>
+          <a:p>
+            <a:r>
+              <a:rPr lang="en-US" dirty="0" smtClean="0"/>
+              <a:t>Modification 3: Memory of Agents </a:t>
+            </a:r>
+            <a:endParaRPr lang="en-US" dirty="0"/>
+          </a:p>
+        </p:txBody>
+      </p:sp>
+      <p:sp>
+        <p:nvSpPr>
+          <p:cNvPr id="3" name="Content Placeholder 2"/>
+          <p:cNvSpPr>
+            <a:spLocks noGrp="1"/>
+          </p:cNvSpPr>
+          <p:nvPr>
+            <p:ph idx="1"/>
+          </p:nvPr>
+        </p:nvSpPr>
+        <p:spPr/>
+        <p:txBody>
+          <a:bodyPr/>
+          <a:lstStyle/>
+          <a:p>
+            <a:r>
+              <a:rPr lang="en-US" dirty="0" smtClean="0"/>
+              <a:t>[maybe add]</a:t>
+            </a:r>
+            <a:endParaRPr lang="en-US" dirty="0"/>
+          </a:p>
+        </p:txBody>
+      </p:sp>
+    </p:spTree>
+    <p:extLst>
+      <p:ext uri="{BB962C8B-B14F-4D97-AF65-F5344CB8AC3E}">
+        <p14:creationId xmlns:p14="http://schemas.microsoft.com/office/powerpoint/2010/main" val="666806807"/>
+      </p:ext>
+    </p:extLst>
+  </p:cSld>
+  <p:clrMapOvr>
+    <a:masterClrMapping/>
+  </p:clrMapOvr>
+</p:sld>
+</file>
+
+<file path=ppt/slides/slide13.xml><?xml version="1.0" encoding="utf-8"?>
+<p:sld xmlns:a="http://schemas.openxmlformats.org/drawingml/2006/main" xmlns:r="http://schemas.openxmlformats.org/officeDocument/2006/relationships" xmlns:p="http://schemas.openxmlformats.org/presentationml/2006/main">
+  <p:cSld>
+    <p:spTree>
+      <p:nvGrpSpPr>
+        <p:cNvPr id="1" name=""/>
+        <p:cNvGrpSpPr/>
+        <p:nvPr/>
+      </p:nvGrpSpPr>
+      <p:grpSpPr>
+        <a:xfrm>
+          <a:off x="0" y="0"/>
+          <a:ext cx="0" cy="0"/>
+          <a:chOff x="0" y="0"/>
+          <a:chExt cx="0" cy="0"/>
+        </a:xfrm>
+      </p:grpSpPr>
+      <p:sp>
+        <p:nvSpPr>
+          <p:cNvPr id="2" name="Title 1"/>
+          <p:cNvSpPr>
+            <a:spLocks noGrp="1"/>
+          </p:cNvSpPr>
+          <p:nvPr>
+            <p:ph type="title"/>
+          </p:nvPr>
+        </p:nvSpPr>
+        <p:spPr/>
+        <p:txBody>
+          <a:bodyPr/>
+          <a:lstStyle/>
+          <a:p>
+            <a:r>
+              <a:rPr lang="en-US" dirty="0" smtClean="0"/>
+              <a:t>Analyses</a:t>
+            </a:r>
+            <a:endParaRPr lang="en-US" dirty="0"/>
+          </a:p>
+        </p:txBody>
+      </p:sp>
+      <p:sp>
+        <p:nvSpPr>
+          <p:cNvPr id="3" name="Content Placeholder 2"/>
+          <p:cNvSpPr>
+            <a:spLocks noGrp="1"/>
+          </p:cNvSpPr>
+          <p:nvPr>
+            <p:ph idx="1"/>
+          </p:nvPr>
+        </p:nvSpPr>
+        <p:spPr/>
+        <p:txBody>
+          <a:bodyPr/>
+          <a:lstStyle/>
+          <a:p>
+            <a:r>
+              <a:rPr lang="en-US" dirty="0" smtClean="0"/>
+              <a:t>Experiment 1: Neighborhood</a:t>
+            </a:r>
+          </a:p>
+          <a:p>
+            <a:r>
+              <a:rPr lang="en-US" dirty="0" smtClean="0"/>
+              <a:t>Experiment 2: Neighborhoods with Movement</a:t>
+            </a:r>
+          </a:p>
+          <a:p>
+            <a:r>
+              <a:rPr lang="en-US" dirty="0" smtClean="0"/>
+              <a:t>Experiment 3: Neighborhoods with Flocking</a:t>
+            </a:r>
+          </a:p>
+          <a:p>
+            <a:r>
+              <a:rPr lang="en-US" dirty="0" smtClean="0"/>
+              <a:t>Experiment 4: Vary Gamma </a:t>
+            </a:r>
+          </a:p>
+          <a:p>
+            <a:r>
+              <a:rPr lang="en-US" dirty="0" smtClean="0"/>
+              <a:t>Experiment 5: Variability in Gamma </a:t>
+            </a:r>
+          </a:p>
+          <a:p>
+            <a:endParaRPr lang="en-US" dirty="0" smtClean="0"/>
+          </a:p>
+          <a:p>
+            <a:endParaRPr lang="en-US" dirty="0"/>
+          </a:p>
+        </p:txBody>
+      </p:sp>
+    </p:spTree>
+    <p:extLst>
+      <p:ext uri="{BB962C8B-B14F-4D97-AF65-F5344CB8AC3E}">
+        <p14:creationId xmlns:p14="http://schemas.microsoft.com/office/powerpoint/2010/main" val="1102832718"/>
+      </p:ext>
+    </p:extLst>
+  </p:cSld>
+  <p:clrMapOvr>
+    <a:masterClrMapping/>
+  </p:clrMapOvr>
+</p:sld>
+</file>
+
+<file path=ppt/slides/slide14.xml><?xml version="1.0" encoding="utf-8"?>
+<p:sld xmlns:a="http://schemas.openxmlformats.org/drawingml/2006/main" xmlns:r="http://schemas.openxmlformats.org/officeDocument/2006/relationships" xmlns:p="http://schemas.openxmlformats.org/presentationml/2006/main">
+  <p:cSld>
+    <p:spTree>
+      <p:nvGrpSpPr>
+        <p:cNvPr id="1" name=""/>
+        <p:cNvGrpSpPr/>
+        <p:nvPr/>
+      </p:nvGrpSpPr>
+      <p:grpSpPr>
+        <a:xfrm>
+          <a:off x="0" y="0"/>
+          <a:ext cx="0" cy="0"/>
+          <a:chOff x="0" y="0"/>
+          <a:chExt cx="0" cy="0"/>
+        </a:xfrm>
+      </p:grpSpPr>
+      <p:sp>
+        <p:nvSpPr>
+          <p:cNvPr id="2" name="Title 1"/>
+          <p:cNvSpPr>
+            <a:spLocks noGrp="1"/>
+          </p:cNvSpPr>
+          <p:nvPr>
+            <p:ph type="title"/>
+          </p:nvPr>
+        </p:nvSpPr>
+        <p:spPr/>
+        <p:txBody>
+          <a:bodyPr/>
+          <a:lstStyle/>
+          <a:p>
+            <a:r>
+              <a:rPr lang="en-US" dirty="0" smtClean="0"/>
+              <a:t>Experiment 1: Radius</a:t>
+            </a:r>
+            <a:endParaRPr lang="en-US" dirty="0"/>
+          </a:p>
+        </p:txBody>
+      </p:sp>
+      <p:sp>
+        <p:nvSpPr>
+          <p:cNvPr id="3" name="Content Placeholder 2"/>
+          <p:cNvSpPr>
+            <a:spLocks noGrp="1"/>
+          </p:cNvSpPr>
+          <p:nvPr>
+            <p:ph idx="1"/>
+          </p:nvPr>
+        </p:nvSpPr>
+        <p:spPr/>
+        <p:txBody>
+          <a:bodyPr/>
+          <a:lstStyle/>
+          <a:p>
+            <a:r>
+              <a:rPr lang="en-US" dirty="0" smtClean="0"/>
+              <a:t>Impact on behavioral choice </a:t>
+            </a:r>
+            <a:endParaRPr lang="en-US" dirty="0"/>
+          </a:p>
+        </p:txBody>
+      </p:sp>
+    </p:spTree>
+    <p:extLst>
+      <p:ext uri="{BB962C8B-B14F-4D97-AF65-F5344CB8AC3E}">
+        <p14:creationId xmlns:p14="http://schemas.microsoft.com/office/powerpoint/2010/main" val="378134169"/>
+      </p:ext>
+    </p:extLst>
+  </p:cSld>
+  <p:clrMapOvr>
+    <a:masterClrMapping/>
+  </p:clrMapOvr>
+</p:sld>
+</file>
+
+<file path=ppt/slides/slide15.xml><?xml version="1.0" encoding="utf-8"?>
+<p:sld xmlns:a="http://schemas.openxmlformats.org/drawingml/2006/main" xmlns:r="http://schemas.openxmlformats.org/officeDocument/2006/relationships" xmlns:p="http://schemas.openxmlformats.org/presentationml/2006/main">
+  <p:cSld>
+    <p:spTree>
+      <p:nvGrpSpPr>
+        <p:cNvPr id="1" name=""/>
+        <p:cNvGrpSpPr/>
+        <p:nvPr/>
+      </p:nvGrpSpPr>
+      <p:grpSpPr>
+        <a:xfrm>
+          <a:off x="0" y="0"/>
+          <a:ext cx="0" cy="0"/>
+          <a:chOff x="0" y="0"/>
+          <a:chExt cx="0" cy="0"/>
+        </a:xfrm>
+      </p:grpSpPr>
+      <p:sp>
+        <p:nvSpPr>
+          <p:cNvPr id="2" name="Title 1"/>
+          <p:cNvSpPr>
+            <a:spLocks noGrp="1"/>
+          </p:cNvSpPr>
+          <p:nvPr>
+            <p:ph type="title"/>
+          </p:nvPr>
+        </p:nvSpPr>
+        <p:spPr/>
+        <p:txBody>
+          <a:bodyPr/>
+          <a:lstStyle/>
+          <a:p>
+            <a:r>
+              <a:rPr lang="en-US" dirty="0" smtClean="0"/>
+              <a:t>Experiment 2: Radius + Speed</a:t>
+            </a:r>
+            <a:endParaRPr lang="en-US" dirty="0"/>
+          </a:p>
+        </p:txBody>
+      </p:sp>
+      <p:sp>
+        <p:nvSpPr>
+          <p:cNvPr id="3" name="Content Placeholder 2"/>
+          <p:cNvSpPr>
+            <a:spLocks noGrp="1"/>
+          </p:cNvSpPr>
+          <p:nvPr>
+            <p:ph idx="1"/>
+          </p:nvPr>
+        </p:nvSpPr>
+        <p:spPr/>
+        <p:txBody>
+          <a:bodyPr/>
+          <a:lstStyle/>
+          <a:p>
+            <a:r>
+              <a:rPr lang="en-US" dirty="0" smtClean="0"/>
+              <a:t>Impact on behavioral choice </a:t>
+            </a:r>
+            <a:endParaRPr lang="en-US" dirty="0"/>
+          </a:p>
+        </p:txBody>
+      </p:sp>
+    </p:spTree>
+    <p:extLst>
+      <p:ext uri="{BB962C8B-B14F-4D97-AF65-F5344CB8AC3E}">
+        <p14:creationId xmlns:p14="http://schemas.microsoft.com/office/powerpoint/2010/main" val="1207222471"/>
+      </p:ext>
+    </p:extLst>
+  </p:cSld>
+  <p:clrMapOvr>
+    <a:masterClrMapping/>
+  </p:clrMapOvr>
+</p:sld>
+</file>
+
+<file path=ppt/slides/slide16.xml><?xml version="1.0" encoding="utf-8"?>
+<p:sld xmlns:a="http://schemas.openxmlformats.org/drawingml/2006/main" xmlns:r="http://schemas.openxmlformats.org/officeDocument/2006/relationships" xmlns:p="http://schemas.openxmlformats.org/presentationml/2006/main">
+  <p:cSld>
+    <p:spTree>
+      <p:nvGrpSpPr>
+        <p:cNvPr id="1" name=""/>
+        <p:cNvGrpSpPr/>
+        <p:nvPr/>
+      </p:nvGrpSpPr>
+      <p:grpSpPr>
+        <a:xfrm>
+          <a:off x="0" y="0"/>
+          <a:ext cx="0" cy="0"/>
+          <a:chOff x="0" y="0"/>
+          <a:chExt cx="0" cy="0"/>
+        </a:xfrm>
+      </p:grpSpPr>
+      <p:sp>
+        <p:nvSpPr>
+          <p:cNvPr id="2" name="Title 1"/>
+          <p:cNvSpPr>
+            <a:spLocks noGrp="1"/>
+          </p:cNvSpPr>
+          <p:nvPr>
+            <p:ph type="title"/>
+          </p:nvPr>
+        </p:nvSpPr>
+        <p:spPr/>
+        <p:txBody>
+          <a:bodyPr/>
+          <a:lstStyle/>
+          <a:p>
+            <a:r>
+              <a:rPr lang="en-US" dirty="0" smtClean="0"/>
+              <a:t>Experiment 3: Radius + Speed + Flocking</a:t>
+            </a:r>
+            <a:endParaRPr lang="en-US" dirty="0"/>
+          </a:p>
+        </p:txBody>
+      </p:sp>
+      <p:sp>
+        <p:nvSpPr>
+          <p:cNvPr id="3" name="Content Placeholder 2"/>
+          <p:cNvSpPr>
+            <a:spLocks noGrp="1"/>
+          </p:cNvSpPr>
+          <p:nvPr>
+            <p:ph idx="1"/>
+          </p:nvPr>
+        </p:nvSpPr>
+        <p:spPr/>
+        <p:txBody>
+          <a:bodyPr/>
+          <a:lstStyle/>
+          <a:p>
+            <a:r>
+              <a:rPr lang="en-US" dirty="0" smtClean="0"/>
+              <a:t>Impact on behavioral choice </a:t>
+            </a:r>
+            <a:endParaRPr lang="en-US" dirty="0"/>
+          </a:p>
+        </p:txBody>
+      </p:sp>
+    </p:spTree>
+    <p:extLst>
+      <p:ext uri="{BB962C8B-B14F-4D97-AF65-F5344CB8AC3E}">
+        <p14:creationId xmlns:p14="http://schemas.microsoft.com/office/powerpoint/2010/main" val="1790354125"/>
+      </p:ext>
+    </p:extLst>
+  </p:cSld>
+  <p:clrMapOvr>
+    <a:masterClrMapping/>
+  </p:clrMapOvr>
+</p:sld>
+</file>
+
+<file path=ppt/slides/slide17.xml><?xml version="1.0" encoding="utf-8"?>
+<p:sld xmlns:a="http://schemas.openxmlformats.org/drawingml/2006/main" xmlns:r="http://schemas.openxmlformats.org/officeDocument/2006/relationships" xmlns:p="http://schemas.openxmlformats.org/presentationml/2006/main">
+  <p:cSld>
+    <p:spTree>
+      <p:nvGrpSpPr>
+        <p:cNvPr id="1" name=""/>
+        <p:cNvGrpSpPr/>
+        <p:nvPr/>
+      </p:nvGrpSpPr>
+      <p:grpSpPr>
+        <a:xfrm>
+          <a:off x="0" y="0"/>
+          <a:ext cx="0" cy="0"/>
+          <a:chOff x="0" y="0"/>
+          <a:chExt cx="0" cy="0"/>
+        </a:xfrm>
+      </p:grpSpPr>
+      <p:sp>
+        <p:nvSpPr>
+          <p:cNvPr id="2" name="Title 1"/>
+          <p:cNvSpPr>
+            <a:spLocks noGrp="1"/>
+          </p:cNvSpPr>
+          <p:nvPr>
+            <p:ph type="title"/>
+          </p:nvPr>
+        </p:nvSpPr>
+        <p:spPr/>
+        <p:txBody>
+          <a:bodyPr/>
+          <a:lstStyle/>
+          <a:p>
+            <a:r>
+              <a:rPr lang="en-US" dirty="0" smtClean="0"/>
+              <a:t>Experiment 4: Gamma</a:t>
+            </a:r>
+            <a:endParaRPr lang="en-US" dirty="0"/>
+          </a:p>
+        </p:txBody>
+      </p:sp>
+      <p:sp>
+        <p:nvSpPr>
+          <p:cNvPr id="3" name="Content Placeholder 2"/>
+          <p:cNvSpPr>
+            <a:spLocks noGrp="1"/>
+          </p:cNvSpPr>
+          <p:nvPr>
+            <p:ph idx="1"/>
+          </p:nvPr>
+        </p:nvSpPr>
+        <p:spPr/>
+        <p:txBody>
+          <a:bodyPr/>
+          <a:lstStyle/>
+          <a:p>
+            <a:r>
+              <a:rPr lang="en-US" dirty="0" smtClean="0"/>
+              <a:t>Impact on behavioral choice </a:t>
+            </a:r>
+            <a:endParaRPr lang="en-US" dirty="0"/>
+          </a:p>
+        </p:txBody>
+      </p:sp>
+    </p:spTree>
+    <p:extLst>
+      <p:ext uri="{BB962C8B-B14F-4D97-AF65-F5344CB8AC3E}">
+        <p14:creationId xmlns:p14="http://schemas.microsoft.com/office/powerpoint/2010/main" val="996071190"/>
+      </p:ext>
+    </p:extLst>
+  </p:cSld>
+  <p:clrMapOvr>
+    <a:masterClrMapping/>
+  </p:clrMapOvr>
+</p:sld>
+</file>
+
+<file path=ppt/slides/slide18.xml><?xml version="1.0" encoding="utf-8"?>
+<p:sld xmlns:a="http://schemas.openxmlformats.org/drawingml/2006/main" xmlns:r="http://schemas.openxmlformats.org/officeDocument/2006/relationships" xmlns:p="http://schemas.openxmlformats.org/presentationml/2006/main">
+  <p:cSld>
+    <p:spTree>
+      <p:nvGrpSpPr>
+        <p:cNvPr id="1" name=""/>
+        <p:cNvGrpSpPr/>
+        <p:nvPr/>
+      </p:nvGrpSpPr>
+      <p:grpSpPr>
+        <a:xfrm>
+          <a:off x="0" y="0"/>
+          <a:ext cx="0" cy="0"/>
+          <a:chOff x="0" y="0"/>
+          <a:chExt cx="0" cy="0"/>
+        </a:xfrm>
+      </p:grpSpPr>
+      <p:sp>
+        <p:nvSpPr>
+          <p:cNvPr id="2" name="Title 1"/>
+          <p:cNvSpPr>
+            <a:spLocks noGrp="1"/>
+          </p:cNvSpPr>
+          <p:nvPr>
+            <p:ph type="title"/>
+          </p:nvPr>
+        </p:nvSpPr>
+        <p:spPr/>
+        <p:txBody>
+          <a:bodyPr/>
+          <a:lstStyle/>
+          <a:p>
+            <a:r>
+              <a:rPr lang="en-US" dirty="0" smtClean="0"/>
+              <a:t>Conclusions and Next Steps</a:t>
+            </a:r>
+            <a:endParaRPr lang="en-US" dirty="0"/>
+          </a:p>
+        </p:txBody>
+      </p:sp>
+      <p:sp>
+        <p:nvSpPr>
+          <p:cNvPr id="3" name="Content Placeholder 2"/>
+          <p:cNvSpPr>
+            <a:spLocks noGrp="1"/>
+          </p:cNvSpPr>
+          <p:nvPr>
+            <p:ph idx="1"/>
+          </p:nvPr>
+        </p:nvSpPr>
+        <p:spPr/>
+        <p:txBody>
+          <a:bodyPr/>
+          <a:lstStyle/>
+          <a:p>
+            <a:endParaRPr lang="en-US"/>
+          </a:p>
+        </p:txBody>
+      </p:sp>
+    </p:spTree>
+    <p:extLst>
+      <p:ext uri="{BB962C8B-B14F-4D97-AF65-F5344CB8AC3E}">
+        <p14:creationId xmlns:p14="http://schemas.microsoft.com/office/powerpoint/2010/main" val="896866910"/>
+      </p:ext>
+    </p:extLst>
+  </p:cSld>
+  <p:clrMapOvr>
+    <a:masterClrMapping/>
+  </p:clrMapOvr>
+</p:sld>
+</file>
+
 <file path=ppt/slides/slide2.xml><?xml version="1.0" encoding="utf-8"?>
 <p:sld xmlns:a="http://schemas.openxmlformats.org/drawingml/2006/main" xmlns:r="http://schemas.openxmlformats.org/officeDocument/2006/relationships" xmlns:p="http://schemas.openxmlformats.org/presentationml/2006/main">
   <p:cSld>
@@ -3451,17 +4538,30 @@
                 <a:solidFill>
                   <a:schemeClr val="tx1"/>
                 </a:solidFill>
-                <a:latin typeface="Times New Roman" panose="02020603050405020304" pitchFamily="18" charset="0"/>
-                <a:cs typeface="Times New Roman" panose="02020603050405020304" pitchFamily="18" charset="0"/>
+                <a:latin typeface="Arial Hebrew" charset="-79"/>
+                <a:ea typeface="Arial Hebrew" charset="-79"/>
+                <a:cs typeface="Arial Hebrew" charset="-79"/>
               </a:rPr>
-              <a:t>Model formulation</a:t>
+              <a:t>Reminder: Model </a:t>
+            </a:r>
+            <a:r>
+              <a:rPr lang="en-US" dirty="0" smtClean="0">
+                <a:solidFill>
+                  <a:schemeClr val="tx1"/>
+                </a:solidFill>
+                <a:latin typeface="Arial Hebrew" charset="-79"/>
+                <a:ea typeface="Arial Hebrew" charset="-79"/>
+                <a:cs typeface="Arial Hebrew" charset="-79"/>
+              </a:rPr>
+              <a:t>formulation</a:t>
             </a:r>
             <a:endParaRPr lang="en-US" dirty="0">
               <a:solidFill>
                 <a:schemeClr val="tx1"/>
               </a:solidFill>
-              <a:latin typeface="Times New Roman" panose="02020603050405020304" pitchFamily="18" charset="0"/>
-              <a:cs typeface="Times New Roman" panose="02020603050405020304" pitchFamily="18" charset="0"/>
+              <a:latin typeface="Arial Hebrew" charset="-79"/>
+              <a:ea typeface="Arial Hebrew" charset="-79"/>
+              <a:cs typeface="Arial Hebrew" charset="-79"/>
             </a:endParaRPr>
           </a:p>
         </p:txBody>
@@ -3474,8 +4574,8 @@
         </p:nvSpPr>
         <p:spPr>
           <a:xfrm>
-            <a:off x="989744" y="2089307"/>
-            <a:ext cx="8075352" cy="3970318"/>
+            <a:off x="989743" y="2034715"/>
+            <a:ext cx="10842865" cy="3970318"/>
           </a:xfrm>
           <a:prstGeom prst="rect">
             <a:avLst/>
@@ -3483,34 +4583,33 @@
           <a:noFill/>
         </p:spPr>
         <p:txBody>
-          <a:bodyPr wrap="none" rtlCol="0">
+          <a:bodyPr wrap="square" rtlCol="0">
             <a:spAutoFit/>
           </a:bodyPr>
           <a:lstStyle/>
           <a:p>
             <a:pPr lvl="0"/>
             <a:r>
-              <a:rPr lang="en-US" sz="3600" dirty="0"/>
-              <a:t>- </a:t>
-            </a:r>
-            <a:r>
               <a:rPr lang="en-US" sz="3600" dirty="0">
-                <a:latin typeface="Times New Roman" panose="02020603050405020304" pitchFamily="18" charset="0"/>
-                <a:cs typeface="Times New Roman" panose="02020603050405020304" pitchFamily="18" charset="0"/>
+                <a:latin typeface="Arial Hebrew" charset="-79"/>
+                <a:ea typeface="Arial Hebrew" charset="-79"/>
+                <a:cs typeface="Arial Hebrew" charset="-79"/>
               </a:rPr>
-              <a:t>Fish population: </a:t>
+              <a:t>- Fish population: </a:t>
             </a:r>
             <a:r>
               <a:rPr lang="en-US" sz="3600" dirty="0" smtClean="0">
-                <a:latin typeface="Times New Roman" panose="02020603050405020304" pitchFamily="18" charset="0"/>
-                <a:cs typeface="Times New Roman" panose="02020603050405020304" pitchFamily="18" charset="0"/>
+                <a:latin typeface="Arial Hebrew" charset="-79"/>
+                <a:ea typeface="Arial Hebrew" charset="-79"/>
+                <a:cs typeface="Arial Hebrew" charset="-79"/>
               </a:rPr>
               <a:t>Standard logistic </a:t>
             </a:r>
             <a:r>
               <a:rPr lang="en-US" sz="3600" dirty="0">
-                <a:latin typeface="Times New Roman" panose="02020603050405020304" pitchFamily="18" charset="0"/>
-                <a:cs typeface="Times New Roman" panose="02020603050405020304" pitchFamily="18" charset="0"/>
+                <a:latin typeface="Arial Hebrew" charset="-79"/>
+                <a:ea typeface="Arial Hebrew" charset="-79"/>
+                <a:cs typeface="Arial Hebrew" charset="-79"/>
               </a:rPr>
               <a:t>growth</a:t>
             </a:r>
@@ -3519,8 +4618,9 @@
             <a:pPr lvl="0"/>
             <a:r>
               <a:rPr lang="en-US" sz="3600" dirty="0">
-                <a:latin typeface="Times New Roman" panose="02020603050405020304" pitchFamily="18" charset="0"/>
-                <a:cs typeface="Times New Roman" panose="02020603050405020304" pitchFamily="18" charset="0"/>
+                <a:latin typeface="Arial Hebrew" charset="-79"/>
+                <a:ea typeface="Arial Hebrew" charset="-79"/>
+                <a:cs typeface="Arial Hebrew" charset="-79"/>
               </a:rPr>
               <a:t>- Gold mine: non-renewable resource</a:t>
             </a:r>
@@ -3529,29 +4629,33 @@
             <a:pPr lvl="0"/>
             <a:r>
               <a:rPr lang="en-US" sz="3600" dirty="0">
-                <a:latin typeface="Times New Roman" panose="02020603050405020304" pitchFamily="18" charset="0"/>
-                <a:cs typeface="Times New Roman" panose="02020603050405020304" pitchFamily="18" charset="0"/>
+                <a:latin typeface="Arial Hebrew" charset="-79"/>
+                <a:ea typeface="Arial Hebrew" charset="-79"/>
+                <a:cs typeface="Arial Hebrew" charset="-79"/>
               </a:rPr>
               <a:t>- Agents have mining and fishing </a:t>
             </a:r>
             <a:r>
               <a:rPr lang="en-US" sz="3600" dirty="0" smtClean="0">
-                <a:latin typeface="Times New Roman" panose="02020603050405020304" pitchFamily="18" charset="0"/>
-                <a:cs typeface="Times New Roman" panose="02020603050405020304" pitchFamily="18" charset="0"/>
+                <a:latin typeface="Arial Hebrew" charset="-79"/>
+                <a:ea typeface="Arial Hebrew" charset="-79"/>
+                <a:cs typeface="Arial Hebrew" charset="-79"/>
               </a:rPr>
               <a:t>skills </a:t>
             </a:r>
             <a:endParaRPr lang="en-US" sz="3600" dirty="0">
-              <a:latin typeface="Times New Roman" panose="02020603050405020304" pitchFamily="18" charset="0"/>
-              <a:cs typeface="Times New Roman" panose="02020603050405020304" pitchFamily="18" charset="0"/>
+              <a:latin typeface="Arial Hebrew" charset="-79"/>
+              <a:ea typeface="Arial Hebrew" charset="-79"/>
+              <a:cs typeface="Arial Hebrew" charset="-79"/>
             </a:endParaRPr>
           </a:p>
           <a:p>
             <a:pPr lvl="0"/>
             <a:r>
               <a:rPr lang="en-US" sz="3600" dirty="0">
-                <a:latin typeface="Times New Roman" panose="02020603050405020304" pitchFamily="18" charset="0"/>
-                <a:cs typeface="Times New Roman" panose="02020603050405020304" pitchFamily="18" charset="0"/>
+                <a:latin typeface="Arial Hebrew" charset="-79"/>
+                <a:ea typeface="Arial Hebrew" charset="-79"/>
+                <a:cs typeface="Arial Hebrew" charset="-79"/>
               </a:rPr>
               <a:t>- Agents derive income from mining and </a:t>
             </a:r>
@@ -3560,69 +4664,73 @@
             <a:pPr lvl="0"/>
             <a:r>
               <a:rPr lang="en-US" sz="3600" dirty="0">
-                <a:latin typeface="Times New Roman" panose="02020603050405020304" pitchFamily="18" charset="0"/>
-                <a:cs typeface="Times New Roman" panose="02020603050405020304" pitchFamily="18" charset="0"/>
+                <a:latin typeface="Arial Hebrew" charset="-79"/>
+                <a:ea typeface="Arial Hebrew" charset="-79"/>
+                <a:cs typeface="Arial Hebrew" charset="-79"/>
               </a:rPr>
               <a:t>   selling surplus </a:t>
             </a:r>
             <a:r>
               <a:rPr lang="en-US" sz="3600" dirty="0" smtClean="0">
-                <a:latin typeface="Times New Roman" panose="02020603050405020304" pitchFamily="18" charset="0"/>
-                <a:cs typeface="Times New Roman" panose="02020603050405020304" pitchFamily="18" charset="0"/>
+                <a:latin typeface="Arial Hebrew" charset="-79"/>
+                <a:ea typeface="Arial Hebrew" charset="-79"/>
+                <a:cs typeface="Arial Hebrew" charset="-79"/>
               </a:rPr>
               <a:t>fish</a:t>
             </a:r>
-            <a:endParaRPr lang="en-US" sz="3600" dirty="0">
-              <a:latin typeface="Times New Roman" panose="02020603050405020304" pitchFamily="18" charset="0"/>
-              <a:cs typeface="Times New Roman" panose="02020603050405020304" pitchFamily="18" charset="0"/>
-            </a:endParaRPr>
-          </a:p>
-          <a:p>
-            <a:pPr marL="571500" indent="-571500">
+          </a:p>
+          <a:p>
+            <a:pPr marL="571500" lvl="0" indent="-571500">
               <a:buFontTx/>
               <a:buChar char="-"/>
             </a:pPr>
             <a:r>
               <a:rPr lang="en-US" sz="3600" dirty="0" smtClean="0">
-                <a:latin typeface="Times New Roman" panose="02020603050405020304" pitchFamily="18" charset="0"/>
-                <a:cs typeface="Times New Roman" panose="02020603050405020304" pitchFamily="18" charset="0"/>
+                <a:latin typeface="Arial Hebrew" charset="-79"/>
+                <a:ea typeface="Arial Hebrew" charset="-79"/>
+                <a:cs typeface="Arial Hebrew" charset="-79"/>
               </a:rPr>
               <a:t>Utility </a:t>
             </a:r>
             <a:r>
               <a:rPr lang="en-US" sz="3600" dirty="0">
-                <a:latin typeface="Times New Roman" panose="02020603050405020304" pitchFamily="18" charset="0"/>
-                <a:cs typeface="Times New Roman" panose="02020603050405020304" pitchFamily="18" charset="0"/>
+                <a:latin typeface="Arial Hebrew" charset="-79"/>
+                <a:ea typeface="Arial Hebrew" charset="-79"/>
+                <a:cs typeface="Arial Hebrew" charset="-79"/>
               </a:rPr>
               <a:t>of agents: Income and Leisure </a:t>
             </a:r>
-            <a:endParaRPr lang="en-US" sz="3600" dirty="0" smtClean="0">
-              <a:latin typeface="Times New Roman" panose="02020603050405020304" pitchFamily="18" charset="0"/>
-              <a:cs typeface="Times New Roman" panose="02020603050405020304" pitchFamily="18" charset="0"/>
+            <a:endParaRPr lang="en-US" sz="3600" dirty="0">
+              <a:latin typeface="Arial Hebrew" charset="-79"/>
+              <a:ea typeface="Arial Hebrew" charset="-79"/>
+              <a:cs typeface="Arial Hebrew" charset="-79"/>
             </a:endParaRPr>
           </a:p>
           <a:p>
-            <a:pPr marL="571500" indent="-571500">
+            <a:pPr marL="571500" lvl="0" indent="-571500">
               <a:buFontTx/>
               <a:buChar char="-"/>
             </a:pPr>
             <a:r>
               <a:rPr lang="en-US" sz="3600" dirty="0" smtClean="0">
-                <a:latin typeface="Times New Roman" panose="02020603050405020304" pitchFamily="18" charset="0"/>
-                <a:cs typeface="Times New Roman" panose="02020603050405020304" pitchFamily="18" charset="0"/>
+                <a:latin typeface="Arial Hebrew" charset="-79"/>
+                <a:ea typeface="Arial Hebrew" charset="-79"/>
+                <a:cs typeface="Arial Hebrew" charset="-79"/>
               </a:rPr>
               <a:t>(</a:t>
             </a:r>
             <a:r>
               <a:rPr lang="en-US" sz="3600" dirty="0">
-                <a:latin typeface="Times New Roman" panose="02020603050405020304" pitchFamily="18" charset="0"/>
-                <a:cs typeface="Times New Roman" panose="02020603050405020304" pitchFamily="18" charset="0"/>
+                <a:latin typeface="Arial Hebrew" charset="-79"/>
+                <a:ea typeface="Arial Hebrew" charset="-79"/>
+                <a:cs typeface="Arial Hebrew" charset="-79"/>
               </a:rPr>
               <a:t>subsistence and leisure needs). </a:t>
             </a:r>
             <a:endParaRPr lang="en-US" sz="3600" dirty="0" smtClean="0">
-              <a:latin typeface="Times New Roman" panose="02020603050405020304" pitchFamily="18" charset="0"/>
-              <a:cs typeface="Times New Roman" panose="02020603050405020304" pitchFamily="18" charset="0"/>
+              <a:latin typeface="Arial Hebrew" charset="-79"/>
+              <a:ea typeface="Arial Hebrew" charset="-79"/>
+              <a:cs typeface="Arial Hebrew" charset="-79"/>
             </a:endParaRPr>
           </a:p>
         </p:txBody>
@@ -3935,12 +5043,12 @@
               </a:spcBef>
             </a:pPr>
             <a:r>
-              <a:rPr lang="en-GB" altLang="en-US" sz="3200">
+              <a:rPr lang="en-GB" altLang="en-US" sz="3200" dirty="0">
                 <a:latin typeface="Arial" charset="0"/>
               </a:rPr>
               <a:t>repetition</a:t>
             </a:r>
-            <a:endParaRPr lang="en-GB" altLang="en-US"/>
+            <a:endParaRPr lang="en-GB" altLang="en-US" dirty="0"/>
           </a:p>
         </p:txBody>
       </p:sp>
@@ -3954,8 +5062,8 @@
         </p:nvSpPr>
         <p:spPr bwMode="auto">
           <a:xfrm>
-            <a:off x="7391400" y="3200400"/>
-            <a:ext cx="2362200" cy="579438"/>
+            <a:off x="7492621" y="3065691"/>
+            <a:ext cx="2362200" cy="892552"/>
           </a:xfrm>
           <a:prstGeom prst="rect">
             <a:avLst/>
@@ -4006,12 +5114,24 @@
               </a:spcBef>
             </a:pPr>
             <a:r>
-              <a:rPr lang="en-GB" altLang="en-US" sz="3200">
+              <a:rPr lang="en-GB" altLang="en-US" sz="3200" dirty="0">
                 <a:latin typeface="Arial" charset="0"/>
               </a:rPr>
-              <a:t>deliberation</a:t>
-            </a:r>
-            <a:endParaRPr lang="en-GB" altLang="en-US"/>
+              <a:t>d</a:t>
+            </a:r>
+            <a:r>
+              <a:rPr lang="en-GB" altLang="en-US" sz="3200" dirty="0" smtClean="0">
+                <a:latin typeface="Arial" charset="0"/>
+              </a:rPr>
+              <a:t>eliberate </a:t>
+            </a:r>
+            <a:r>
+              <a:rPr lang="en-GB" altLang="en-US" sz="2000" dirty="0" smtClean="0">
+                <a:latin typeface="Arial" charset="0"/>
+              </a:rPr>
+              <a:t>(optimize)</a:t>
+            </a:r>
+            <a:endParaRPr lang="en-GB" altLang="en-US" sz="2000" dirty="0"/>
           </a:p>
         </p:txBody>
       </p:sp>
@@ -4096,8 +5216,8 @@
         </p:nvSpPr>
         <p:spPr bwMode="auto">
           <a:xfrm>
-            <a:off x="7391400" y="4648200"/>
-            <a:ext cx="2286000" cy="1066800"/>
+            <a:off x="7467600" y="4583668"/>
+            <a:ext cx="2286000" cy="1384995"/>
           </a:xfrm>
           <a:prstGeom prst="rect">
             <a:avLst/>
@@ -4148,12 +5268,24 @@
               </a:spcBef>
             </a:pPr>
             <a:r>
-              <a:rPr lang="en-GB" altLang="en-US" sz="3200">
+              <a:rPr lang="en-GB" altLang="en-US" sz="3200" dirty="0">
                 <a:latin typeface="Arial" charset="0"/>
               </a:rPr>
-              <a:t>social comparison</a:t>
-            </a:r>
-            <a:endParaRPr lang="en-GB" altLang="en-US"/>
+              <a:t>social </a:t>
+            </a:r>
+            <a:r>
+              <a:rPr lang="en-GB" altLang="en-US" sz="3200" dirty="0" smtClean="0">
+                <a:latin typeface="Arial" charset="0"/>
+              </a:rPr>
+              <a:t>comparison </a:t>
+            </a:r>
+            <a:r>
+              <a:rPr lang="en-GB" altLang="en-US" sz="2000" dirty="0" smtClean="0">
+                <a:latin typeface="Arial" charset="0"/>
+              </a:rPr>
+              <a:t>(inquire)</a:t>
+            </a:r>
+            <a:endParaRPr lang="en-GB" altLang="en-US" sz="2000" dirty="0"/>
           </a:p>
         </p:txBody>
       </p:sp>
@@ -5005,8 +6137,8 @@
         </p:nvSpPr>
         <p:spPr bwMode="auto">
           <a:xfrm>
-            <a:off x="1828800" y="990601"/>
-            <a:ext cx="2895600" cy="1160463"/>
+            <a:off x="887104" y="990601"/>
+            <a:ext cx="3837296" cy="1160463"/>
           </a:xfrm>
           <a:prstGeom prst="rect">
             <a:avLst/>
@@ -5046,7 +6178,7 @@
           </a:extLst>
         </p:spPr>
         <p:txBody>
-          <a:bodyPr>
+          <a:bodyPr wrap="square">
             <a:spAutoFit/>
           </a:bodyPr>
           <a:lstStyle/>
@@ -5070,12 +6202,12 @@
               </a:spcBef>
             </a:pPr>
             <a:r>
-              <a:rPr lang="en-GB" altLang="en-US" sz="2800">
+              <a:rPr lang="en-GB" altLang="en-US" sz="2800" dirty="0">
                 <a:latin typeface="Arial" charset="0"/>
               </a:rPr>
               <a:t>tolerance</a:t>
             </a:r>
-            <a:endParaRPr lang="en-GB" altLang="en-US"/>
+            <a:endParaRPr lang="en-GB" altLang="en-US" dirty="0"/>
           </a:p>
         </p:txBody>
       </p:sp>
@@ -5286,14 +6418,24 @@
           <a:p>
             <a:r>
               <a:rPr lang="en-US" dirty="0" smtClean="0">
-                <a:latin typeface="Times New Roman" panose="02020603050405020304" pitchFamily="18" charset="0"/>
-                <a:cs typeface="Times New Roman" panose="02020603050405020304" pitchFamily="18" charset="0"/>
+                <a:latin typeface="Arial Hebrew" charset="-79"/>
+                <a:ea typeface="Arial Hebrew" charset="-79"/>
+                <a:cs typeface="Arial Hebrew" charset="-79"/>
               </a:rPr>
-              <a:t>Project 2:</a:t>
+              <a:t>Project 2</a:t>
+            </a:r>
+            <a:r>
+              <a:rPr lang="en-US" smtClean="0">
+                <a:latin typeface="Arial Hebrew" charset="-79"/>
+                <a:ea typeface="Arial Hebrew" charset="-79"/>
+                <a:cs typeface="Arial Hebrew" charset="-79"/>
+              </a:rPr>
+              <a:t>: Expanding the Model</a:t>
             </a:r>
             <a:endParaRPr lang="en-US" dirty="0">
-              <a:latin typeface="Times New Roman" panose="02020603050405020304" pitchFamily="18" charset="0"/>
-              <a:cs typeface="Times New Roman" panose="02020603050405020304" pitchFamily="18" charset="0"/>
+              <a:latin typeface="Arial Hebrew" charset="-79"/>
+              <a:ea typeface="Arial Hebrew" charset="-79"/>
+              <a:cs typeface="Arial Hebrew" charset="-79"/>
             </a:endParaRPr>
           </a:p>
         </p:txBody>
@@ -5317,22 +6459,25 @@
           <a:p>
             <a:r>
               <a:rPr lang="en-US" sz="2800" dirty="0" smtClean="0">
-                <a:latin typeface="Times New Roman" panose="02020603050405020304" pitchFamily="18" charset="0"/>
-                <a:cs typeface="Times New Roman" panose="02020603050405020304" pitchFamily="18" charset="0"/>
+                <a:latin typeface="Arial Hebrew" charset="-79"/>
+                <a:ea typeface="Arial Hebrew" charset="-79"/>
+                <a:cs typeface="Arial Hebrew" charset="-79"/>
               </a:rPr>
               <a:t>What if agents are not all interact but spatially distributed </a:t>
             </a:r>
             <a:r>
               <a:rPr lang="en-US" dirty="0" smtClean="0">
-                <a:latin typeface="Times New Roman" panose="02020603050405020304" pitchFamily="18" charset="0"/>
-                <a:cs typeface="Times New Roman" panose="02020603050405020304" pitchFamily="18" charset="0"/>
+                <a:latin typeface="Arial Hebrew" charset="-79"/>
+                <a:ea typeface="Arial Hebrew" charset="-79"/>
+                <a:cs typeface="Arial Hebrew" charset="-79"/>
               </a:rPr>
               <a:t>and interact</a:t>
             </a:r>
             <a:r>
               <a:rPr lang="en-US" sz="2800" dirty="0" smtClean="0">
-                <a:latin typeface="Times New Roman" panose="02020603050405020304" pitchFamily="18" charset="0"/>
-                <a:cs typeface="Times New Roman" panose="02020603050405020304" pitchFamily="18" charset="0"/>
+                <a:latin typeface="Arial Hebrew" charset="-79"/>
+                <a:ea typeface="Arial Hebrew" charset="-79"/>
+                <a:cs typeface="Arial Hebrew" charset="-79"/>
               </a:rPr>
               <a:t> in a social network?</a:t>
             </a:r>
@@ -5340,22 +6485,25 @@
           <a:p>
             <a:r>
               <a:rPr lang="en-US" sz="2800" dirty="0" smtClean="0">
-                <a:latin typeface="Times New Roman" panose="02020603050405020304" pitchFamily="18" charset="0"/>
-                <a:cs typeface="Times New Roman" panose="02020603050405020304" pitchFamily="18" charset="0"/>
+                <a:latin typeface="Arial Hebrew" charset="-79"/>
+                <a:ea typeface="Arial Hebrew" charset="-79"/>
+                <a:cs typeface="Arial Hebrew" charset="-79"/>
               </a:rPr>
               <a:t>What if there are different degrees of conformity? (including additional needs</a:t>
             </a:r>
             <a:r>
               <a:rPr lang="en-US" sz="2800" dirty="0">
-                <a:latin typeface="Times New Roman" panose="02020603050405020304" pitchFamily="18" charset="0"/>
-                <a:cs typeface="Times New Roman" panose="02020603050405020304" pitchFamily="18" charset="0"/>
+                <a:latin typeface="Arial Hebrew" charset="-79"/>
+                <a:ea typeface="Arial Hebrew" charset="-79"/>
+                <a:cs typeface="Arial Hebrew" charset="-79"/>
               </a:rPr>
               <a:t>:</a:t>
             </a:r>
             <a:r>
               <a:rPr lang="en-US" sz="2800" dirty="0" smtClean="0">
-                <a:latin typeface="Times New Roman" panose="02020603050405020304" pitchFamily="18" charset="0"/>
-                <a:cs typeface="Times New Roman" panose="02020603050405020304" pitchFamily="18" charset="0"/>
+                <a:latin typeface="Arial Hebrew" charset="-79"/>
+                <a:ea typeface="Arial Hebrew" charset="-79"/>
+                <a:cs typeface="Arial Hebrew" charset="-79"/>
               </a:rPr>
               <a:t> identity/understanding).</a:t>
             </a:r>
@@ -5363,8 +6511,9 @@
           <a:p>
             <a:r>
               <a:rPr lang="en-US" sz="2800" dirty="0" smtClean="0">
-                <a:latin typeface="Times New Roman" panose="02020603050405020304" pitchFamily="18" charset="0"/>
-                <a:cs typeface="Times New Roman" panose="02020603050405020304" pitchFamily="18" charset="0"/>
+                <a:latin typeface="Arial Hebrew" charset="-79"/>
+                <a:ea typeface="Arial Hebrew" charset="-79"/>
+                <a:cs typeface="Arial Hebrew" charset="-79"/>
               </a:rPr>
               <a:t>What if information and knowledge is not perfect (model of fish stock, limited observations of returns of actions of others)?</a:t>
             </a:r>
@@ -5427,10 +6576,26 @@
           <a:lstStyle/>
           <a:p>
             <a:r>
-              <a:rPr lang="en-US" dirty="0" smtClean="0"/>
-              <a:t>Modifications</a:t>
-            </a:r>
-            <a:endParaRPr lang="en-US" dirty="0"/>
+              <a:rPr lang="en-US" dirty="0" smtClean="0">
+                <a:latin typeface="Arial Hebrew" charset="-79"/>
+                <a:ea typeface="Arial Hebrew" charset="-79"/>
+                <a:cs typeface="Arial Hebrew" charset="-79"/>
+              </a:rPr>
+              <a:t>Project 2</a:t>
+            </a:r>
+            <a:r>
+              <a:rPr lang="en-US" smtClean="0">
+                <a:latin typeface="Arial Hebrew" charset="-79"/>
+                <a:ea typeface="Arial Hebrew" charset="-79"/>
+                <a:cs typeface="Arial Hebrew" charset="-79"/>
+              </a:rPr>
+              <a:t>: Expanding the Model</a:t>
+            </a:r>
+            <a:endParaRPr lang="en-US" dirty="0">
+              <a:latin typeface="Arial Hebrew" charset="-79"/>
+              <a:ea typeface="Arial Hebrew" charset="-79"/>
+              <a:cs typeface="Arial Hebrew" charset="-79"/>
+            </a:endParaRPr>
           </a:p>
         </p:txBody>
       </p:sp>
@@ -5446,9 +6611,165 @@
         </p:nvSpPr>
         <p:spPr/>
         <p:txBody>
-          <a:bodyPr/>
-          <a:lstStyle/>
-          <a:p>
+          <a:bodyPr>
+            <a:normAutofit/>
+          </a:bodyPr>
+          <a:lstStyle/>
+          <a:p>
+            <a:r>
+              <a:rPr lang="en-US" sz="2800" dirty="0" smtClean="0">
+                <a:latin typeface="Arial Hebrew" charset="-79"/>
+                <a:ea typeface="Arial Hebrew" charset="-79"/>
+                <a:cs typeface="Arial Hebrew" charset="-79"/>
+              </a:rPr>
+              <a:t>What if agents are not all interact but spatially distributed </a:t>
+            </a:r>
+            <a:r>
+              <a:rPr lang="en-US" dirty="0" smtClean="0">
+                <a:latin typeface="Arial Hebrew" charset="-79"/>
+                <a:ea typeface="Arial Hebrew" charset="-79"/>
+                <a:cs typeface="Arial Hebrew" charset="-79"/>
+              </a:rPr>
+              <a:t>and interact</a:t>
+            </a:r>
+            <a:r>
+              <a:rPr lang="en-US" sz="2800" dirty="0" smtClean="0">
+                <a:latin typeface="Arial Hebrew" charset="-79"/>
+                <a:ea typeface="Arial Hebrew" charset="-79"/>
+                <a:cs typeface="Arial Hebrew" charset="-79"/>
+              </a:rPr>
+              <a:t> in a social network?</a:t>
+            </a:r>
+          </a:p>
+          <a:p>
+            <a:r>
+              <a:rPr lang="en-US" sz="2800" dirty="0" smtClean="0">
+                <a:latin typeface="Arial Hebrew" charset="-79"/>
+                <a:ea typeface="Arial Hebrew" charset="-79"/>
+                <a:cs typeface="Arial Hebrew" charset="-79"/>
+              </a:rPr>
+              <a:t>What if there are different degrees of conformity? (including additional needs</a:t>
+            </a:r>
+            <a:r>
+              <a:rPr lang="en-US" sz="2800" dirty="0">
+                <a:latin typeface="Arial Hebrew" charset="-79"/>
+                <a:ea typeface="Arial Hebrew" charset="-79"/>
+                <a:cs typeface="Arial Hebrew" charset="-79"/>
+              </a:rPr>
+              <a:t>:</a:t>
+            </a:r>
+            <a:r>
+              <a:rPr lang="en-US" sz="2800" dirty="0" smtClean="0">
+                <a:latin typeface="Arial Hebrew" charset="-79"/>
+                <a:ea typeface="Arial Hebrew" charset="-79"/>
+                <a:cs typeface="Arial Hebrew" charset="-79"/>
+              </a:rPr>
+              <a:t> identity/understanding).</a:t>
+            </a:r>
+          </a:p>
+          <a:p>
+            <a:r>
+              <a:rPr lang="en-US" sz="2800" dirty="0" smtClean="0">
+                <a:latin typeface="Arial Hebrew" charset="-79"/>
+                <a:ea typeface="Arial Hebrew" charset="-79"/>
+                <a:cs typeface="Arial Hebrew" charset="-79"/>
+              </a:rPr>
+              <a:t>What if information and knowledge is not perfect (model of fish stock, limited observations of returns of actions of others)?</a:t>
+            </a:r>
+          </a:p>
+          <a:p>
+            <a:endParaRPr lang="en-US" sz="2800" dirty="0"/>
+          </a:p>
+        </p:txBody>
+      </p:sp>
+      <p:sp>
+        <p:nvSpPr>
+          <p:cNvPr id="4" name="Rectangle 3"/>
+          <p:cNvSpPr/>
+          <p:nvPr/>
+        </p:nvSpPr>
+        <p:spPr>
+          <a:xfrm>
+            <a:off x="668740" y="1825625"/>
+            <a:ext cx="9976514" cy="822041"/>
+          </a:xfrm>
+          <a:prstGeom prst="rect">
+            <a:avLst/>
+          </a:prstGeom>
+          <a:noFill/>
+          <a:ln w="57150">
+            <a:solidFill>
+              <a:srgbClr val="C00000"/>
+            </a:solidFill>
+          </a:ln>
+        </p:spPr>
+        <p:style>
+          <a:lnRef idx="2">
+            <a:schemeClr val="accent1">
+              <a:shade val="50000"/>
+            </a:schemeClr>
+          </a:lnRef>
+          <a:fillRef idx="1">
+            <a:schemeClr val="accent1"/>
+          </a:fillRef>
+          <a:effectRef idx="0">
+            <a:schemeClr val="accent1"/>
+          </a:effectRef>
+          <a:fontRef idx="minor">
+            <a:schemeClr val="lt1"/>
+          </a:fontRef>
+        </p:style>
+        <p:txBody>
+          <a:bodyPr rtlCol="0" anchor="ctr"/>
+          <a:lstStyle/>
+          <a:p>
+            <a:pPr algn="ctr"/>
+            <a:endParaRPr lang="en-US"/>
+          </a:p>
+        </p:txBody>
+      </p:sp>
+      <p:sp>
+        <p:nvSpPr>
+          <p:cNvPr id="5" name="Rectangle 4"/>
+          <p:cNvSpPr/>
+          <p:nvPr/>
+        </p:nvSpPr>
+        <p:spPr>
+          <a:xfrm>
+            <a:off x="668740" y="3590273"/>
+            <a:ext cx="9976514" cy="822041"/>
+          </a:xfrm>
+          <a:prstGeom prst="rect">
+            <a:avLst/>
+          </a:prstGeom>
+          <a:noFill/>
+          <a:ln w="57150">
+            <a:solidFill>
+              <a:srgbClr val="C00000"/>
+            </a:solidFill>
+          </a:ln>
+        </p:spPr>
+        <p:style>
+          <a:lnRef idx="2">
+            <a:schemeClr val="accent1">
+              <a:shade val="50000"/>
+            </a:schemeClr>
+          </a:lnRef>
+          <a:fillRef idx="1">
+            <a:schemeClr val="accent1"/>
+          </a:fillRef>
+          <a:effectRef idx="0">
+            <a:schemeClr val="accent1"/>
+          </a:effectRef>
+          <a:fontRef idx="minor">
+            <a:schemeClr val="lt1"/>
+          </a:fontRef>
+        </p:style>
+        <p:txBody>
+          <a:bodyPr rtlCol="0" anchor="ctr"/>
+          <a:lstStyle/>
+          <a:p>
+            <a:pPr algn="ctr"/>
             <a:endParaRPr lang="en-US"/>
           </a:p>
         </p:txBody>
@@ -5456,13 +6777,20 @@
     </p:spTree>
     <p:extLst>
       <p:ext uri="{BB962C8B-B14F-4D97-AF65-F5344CB8AC3E}">
-        <p14:creationId xmlns:p14="http://schemas.microsoft.com/office/powerpoint/2010/main" val="1595339328"/>
+        <p14:creationId xmlns:p14="http://schemas.microsoft.com/office/powerpoint/2010/main" val="1214526016"/>
       </p:ext>
     </p:extLst>
   </p:cSld>
   <p:clrMapOvr>
     <a:masterClrMapping/>
   </p:clrMapOvr>
+  <p:timing>
+    <p:tnLst>
+      <p:par>
+        <p:cTn id="1" dur="indefinite" restart="never" nodeType="tmRoot"/>
+      </p:par>
+    </p:tnLst>
+  </p:timing>
 </p:sld>
 </file>
 
@@ -5500,65 +6828,220 @@
           <a:p>
             <a:r>
               <a:rPr lang="en-US" dirty="0" smtClean="0"/>
-              <a:t>Analyses</a:t>
+              <a:t>Modification 1: Spatial</a:t>
             </a:r>
             <a:endParaRPr lang="en-US" dirty="0"/>
           </a:p>
         </p:txBody>
       </p:sp>
-      <p:sp>
-        <p:nvSpPr>
-          <p:cNvPr id="3" name="Content Placeholder 2"/>
-          <p:cNvSpPr>
-            <a:spLocks noGrp="1"/>
-          </p:cNvSpPr>
-          <p:nvPr>
-            <p:ph idx="1"/>
-          </p:nvPr>
-        </p:nvSpPr>
-        <p:spPr/>
-        <p:txBody>
-          <a:bodyPr/>
-          <a:lstStyle/>
-          <a:p>
+      <p:pic>
+        <p:nvPicPr>
+          <p:cNvPr id="4" name="Picture 3"/>
+          <p:cNvPicPr>
+            <a:picLocks noChangeAspect="1"/>
+          </p:cNvPicPr>
+          <p:nvPr/>
+        </p:nvPicPr>
+        <p:blipFill rotWithShape="1">
+          <a:blip r:embed="rId2"/>
+          <a:srcRect l="3901"/>
+          <a:stretch/>
+        </p:blipFill>
+        <p:spPr>
+          <a:xfrm>
+            <a:off x="838200" y="1581504"/>
+            <a:ext cx="4230806" cy="4320095"/>
+          </a:xfrm>
+          <a:prstGeom prst="rect">
+            <a:avLst/>
+          </a:prstGeom>
+        </p:spPr>
+      </p:pic>
+      <p:sp>
+        <p:nvSpPr>
+          <p:cNvPr id="5" name="TextBox 4"/>
+          <p:cNvSpPr txBox="1"/>
+          <p:nvPr/>
+        </p:nvSpPr>
+        <p:spPr>
+          <a:xfrm>
+            <a:off x="838200" y="5901599"/>
+            <a:ext cx="3452884" cy="369332"/>
+          </a:xfrm>
+          <a:prstGeom prst="rect">
+            <a:avLst/>
+          </a:prstGeom>
+          <a:noFill/>
+        </p:spPr>
+        <p:txBody>
+          <a:bodyPr wrap="square" rtlCol="0">
+            <a:spAutoFit/>
+          </a:bodyPr>
+          <a:lstStyle/>
+          <a:p>
+            <a:r>
+              <a:rPr lang="en-US" b="1" dirty="0" smtClean="0"/>
+              <a:t>After</a:t>
+            </a:r>
             <a:r>
               <a:rPr lang="en-US" dirty="0" smtClean="0"/>
-              <a:t>Default Run</a:t>
-            </a:r>
-          </a:p>
-          <a:p>
+              <a:t>:  Spatially Distributed Agents</a:t>
+            </a:r>
+            <a:endParaRPr lang="en-US" dirty="0"/>
+          </a:p>
+        </p:txBody>
+      </p:sp>
+      <p:sp>
+        <p:nvSpPr>
+          <p:cNvPr id="6" name="TextBox 5"/>
+          <p:cNvSpPr txBox="1"/>
+          <p:nvPr/>
+        </p:nvSpPr>
+        <p:spPr>
+          <a:xfrm>
+            <a:off x="1834486" y="6270931"/>
+            <a:ext cx="2238233" cy="369332"/>
+          </a:xfrm>
+          <a:prstGeom prst="rect">
+            <a:avLst/>
+          </a:prstGeom>
+          <a:noFill/>
+        </p:spPr>
+        <p:txBody>
+          <a:bodyPr wrap="square" rtlCol="0">
+            <a:spAutoFit/>
+          </a:bodyPr>
+          <a:lstStyle/>
+          <a:p>
+            <a:r>
+              <a:rPr lang="en-US" b="1" dirty="0" smtClean="0">
+                <a:solidFill>
+                  <a:schemeClr val="accent1">
+                    <a:lumMod val="75000"/>
+                  </a:schemeClr>
+                </a:solidFill>
+              </a:rPr>
+              <a:t>Fishing</a:t>
+            </a:r>
             <a:r>
               <a:rPr lang="en-US" dirty="0" smtClean="0"/>
-              <a:t>Experiment 1: Neighborhood</a:t>
-            </a:r>
-          </a:p>
-          <a:p>
-            <a:r>
-              <a:rPr lang="en-US" dirty="0" smtClean="0"/>
-              <a:t>Experiment 2: Neighborhoods with Movement</a:t>
-            </a:r>
-          </a:p>
-          <a:p>
-            <a:r>
-              <a:rPr lang="en-US" dirty="0" smtClean="0"/>
-              <a:t>Experiment 3: Neighborhoods with Flocking</a:t>
-            </a:r>
-          </a:p>
-          <a:p>
-            <a:r>
-              <a:rPr lang="en-US" dirty="0" smtClean="0"/>
-              <a:t>[Experiment 4]</a:t>
-            </a:r>
-          </a:p>
-          <a:p>
-            <a:endParaRPr lang="en-US" dirty="0"/>
+              <a:t> &amp; </a:t>
+            </a:r>
+            <a:r>
+              <a:rPr lang="en-US" b="1" dirty="0" smtClean="0">
+                <a:solidFill>
+                  <a:srgbClr val="FFC000"/>
+                </a:solidFill>
+              </a:rPr>
+              <a:t>Mining</a:t>
+            </a:r>
+            <a:endParaRPr lang="en-US" b="1" dirty="0">
+              <a:solidFill>
+                <a:srgbClr val="FFC000"/>
+              </a:solidFill>
+            </a:endParaRPr>
+          </a:p>
+        </p:txBody>
+      </p:sp>
+      <p:pic>
+        <p:nvPicPr>
+          <p:cNvPr id="7" name="Picture 6"/>
+          <p:cNvPicPr>
+            <a:picLocks noChangeAspect="1"/>
+          </p:cNvPicPr>
+          <p:nvPr/>
+        </p:nvPicPr>
+        <p:blipFill>
+          <a:blip r:embed="rId3"/>
+          <a:stretch>
+            <a:fillRect/>
+          </a:stretch>
+        </p:blipFill>
+        <p:spPr>
+          <a:xfrm>
+            <a:off x="6096000" y="1581504"/>
+            <a:ext cx="1723416" cy="1707605"/>
+          </a:xfrm>
+          <a:prstGeom prst="rect">
+            <a:avLst/>
+          </a:prstGeom>
+        </p:spPr>
+      </p:pic>
+      <p:sp>
+        <p:nvSpPr>
+          <p:cNvPr id="8" name="TextBox 7"/>
+          <p:cNvSpPr txBox="1"/>
+          <p:nvPr/>
+        </p:nvSpPr>
+        <p:spPr>
+          <a:xfrm>
+            <a:off x="6096000" y="3370997"/>
+            <a:ext cx="1642281" cy="369332"/>
+          </a:xfrm>
+          <a:prstGeom prst="rect">
+            <a:avLst/>
+          </a:prstGeom>
+          <a:noFill/>
+        </p:spPr>
+        <p:txBody>
+          <a:bodyPr wrap="square" rtlCol="0">
+            <a:spAutoFit/>
+          </a:bodyPr>
+          <a:lstStyle/>
+          <a:p>
+            <a:pPr algn="ctr"/>
+            <a:r>
+              <a:rPr lang="en-US" b="1" dirty="0" smtClean="0"/>
+              <a:t>Before </a:t>
+            </a:r>
+            <a:endParaRPr lang="en-US" b="1" dirty="0"/>
+          </a:p>
+        </p:txBody>
+      </p:sp>
+      <p:sp>
+        <p:nvSpPr>
+          <p:cNvPr id="11" name="Right Arrow 10"/>
+          <p:cNvSpPr/>
+          <p:nvPr/>
+        </p:nvSpPr>
+        <p:spPr>
+          <a:xfrm rot="10800000">
+            <a:off x="5069006" y="2197290"/>
+            <a:ext cx="690349" cy="409432"/>
+          </a:xfrm>
+          <a:prstGeom prst="rightArrow">
+            <a:avLst/>
+          </a:prstGeom>
+        </p:spPr>
+        <p:style>
+          <a:lnRef idx="2">
+            <a:schemeClr val="accent1">
+              <a:shade val="50000"/>
+            </a:schemeClr>
+          </a:lnRef>
+          <a:fillRef idx="1">
+            <a:schemeClr val="accent1"/>
+          </a:fillRef>
+          <a:effectRef idx="0">
+            <a:schemeClr val="accent1"/>
+          </a:effectRef>
+          <a:fontRef idx="minor">
+            <a:schemeClr val="lt1"/>
+          </a:fontRef>
+        </p:style>
+        <p:txBody>
+          <a:bodyPr rtlCol="0" anchor="ctr"/>
+          <a:lstStyle/>
+          <a:p>
+            <a:pPr algn="ctr"/>
+            <a:endParaRPr lang="en-US"/>
           </a:p>
         </p:txBody>
       </p:sp>
     </p:spTree>
     <p:extLst>
       <p:ext uri="{BB962C8B-B14F-4D97-AF65-F5344CB8AC3E}">
-        <p14:creationId xmlns:p14="http://schemas.microsoft.com/office/powerpoint/2010/main" val="1102832718"/>
+        <p14:creationId xmlns:p14="http://schemas.microsoft.com/office/powerpoint/2010/main" val="1595339328"/>
       </p:ext>
     </p:extLst>
   </p:cSld>
@@ -5602,35 +7085,183 @@
           <a:p>
             <a:r>
               <a:rPr lang="en-US" dirty="0" smtClean="0"/>
-              <a:t>Results</a:t>
+              <a:t>Modification 1: Spatial</a:t>
             </a:r>
             <a:endParaRPr lang="en-US" dirty="0"/>
           </a:p>
         </p:txBody>
       </p:sp>
-      <p:sp>
-        <p:nvSpPr>
-          <p:cNvPr id="3" name="Content Placeholder 2"/>
-          <p:cNvSpPr>
-            <a:spLocks noGrp="1"/>
-          </p:cNvSpPr>
-          <p:nvPr>
-            <p:ph idx="1"/>
-          </p:nvPr>
-        </p:nvSpPr>
-        <p:spPr/>
-        <p:txBody>
-          <a:bodyPr/>
-          <a:lstStyle/>
-          <a:p>
+      <p:pic>
+        <p:nvPicPr>
+          <p:cNvPr id="4" name="Picture 3"/>
+          <p:cNvPicPr>
+            <a:picLocks noChangeAspect="1"/>
+          </p:cNvPicPr>
+          <p:nvPr/>
+        </p:nvPicPr>
+        <p:blipFill rotWithShape="1">
+          <a:blip r:embed="rId2"/>
+          <a:srcRect l="3901"/>
+          <a:stretch/>
+        </p:blipFill>
+        <p:spPr>
+          <a:xfrm>
+            <a:off x="838200" y="1581504"/>
+            <a:ext cx="4230806" cy="4320095"/>
+          </a:xfrm>
+          <a:prstGeom prst="rect">
+            <a:avLst/>
+          </a:prstGeom>
+        </p:spPr>
+      </p:pic>
+      <p:pic>
+        <p:nvPicPr>
+          <p:cNvPr id="8" name="Picture 7"/>
+          <p:cNvPicPr>
+            <a:picLocks noChangeAspect="1"/>
+          </p:cNvPicPr>
+          <p:nvPr/>
+        </p:nvPicPr>
+        <p:blipFill>
+          <a:blip r:embed="rId3"/>
+          <a:stretch>
+            <a:fillRect/>
+          </a:stretch>
+        </p:blipFill>
+        <p:spPr>
+          <a:xfrm>
+            <a:off x="5444888" y="1581504"/>
+            <a:ext cx="2825656" cy="645864"/>
+          </a:xfrm>
+          <a:prstGeom prst="rect">
+            <a:avLst/>
+          </a:prstGeom>
+        </p:spPr>
+      </p:pic>
+      <p:sp>
+        <p:nvSpPr>
+          <p:cNvPr id="9" name="TextBox 8"/>
+          <p:cNvSpPr txBox="1"/>
+          <p:nvPr/>
+        </p:nvSpPr>
+        <p:spPr>
+          <a:xfrm>
+            <a:off x="8646426" y="1579403"/>
+            <a:ext cx="3008763" cy="646331"/>
+          </a:xfrm>
+          <a:prstGeom prst="rect">
+            <a:avLst/>
+          </a:prstGeom>
+          <a:noFill/>
+        </p:spPr>
+        <p:txBody>
+          <a:bodyPr wrap="square" rtlCol="0">
+            <a:spAutoFit/>
+          </a:bodyPr>
+          <a:lstStyle/>
+          <a:p>
+            <a:r>
+              <a:rPr lang="en-US" dirty="0" smtClean="0"/>
+              <a:t>What percentage of </a:t>
+            </a:r>
+            <a:r>
+              <a:rPr lang="en-US" smtClean="0"/>
+              <a:t>the world does a turtle learn from?</a:t>
+            </a:r>
             <a:endParaRPr lang="en-US"/>
+          </a:p>
+        </p:txBody>
+      </p:sp>
+      <p:sp>
+        <p:nvSpPr>
+          <p:cNvPr id="12" name="TextBox 11"/>
+          <p:cNvSpPr txBox="1"/>
+          <p:nvPr/>
+        </p:nvSpPr>
+        <p:spPr>
+          <a:xfrm>
+            <a:off x="838200" y="5901599"/>
+            <a:ext cx="3452884" cy="369332"/>
+          </a:xfrm>
+          <a:prstGeom prst="rect">
+            <a:avLst/>
+          </a:prstGeom>
+          <a:noFill/>
+        </p:spPr>
+        <p:txBody>
+          <a:bodyPr wrap="square" rtlCol="0">
+            <a:spAutoFit/>
+          </a:bodyPr>
+          <a:lstStyle/>
+          <a:p>
+            <a:r>
+              <a:rPr lang="en-US" dirty="0"/>
+              <a:t> </a:t>
+            </a:r>
+            <a:r>
+              <a:rPr lang="en-US" dirty="0" smtClean="0"/>
+              <a:t>           Spatially Distributed Agents</a:t>
+            </a:r>
+            <a:endParaRPr lang="en-US" dirty="0"/>
+          </a:p>
+        </p:txBody>
+      </p:sp>
+      <p:sp>
+        <p:nvSpPr>
+          <p:cNvPr id="13" name="TextBox 12"/>
+          <p:cNvSpPr txBox="1"/>
+          <p:nvPr/>
+        </p:nvSpPr>
+        <p:spPr>
+          <a:xfrm>
+            <a:off x="1834486" y="6270931"/>
+            <a:ext cx="2238233" cy="369332"/>
+          </a:xfrm>
+          <a:prstGeom prst="rect">
+            <a:avLst/>
+          </a:prstGeom>
+          <a:noFill/>
+        </p:spPr>
+        <p:txBody>
+          <a:bodyPr wrap="square" rtlCol="0">
+            <a:spAutoFit/>
+          </a:bodyPr>
+          <a:lstStyle/>
+          <a:p>
+            <a:r>
+              <a:rPr lang="en-US" b="1" dirty="0" smtClean="0">
+                <a:solidFill>
+                  <a:schemeClr val="accent1">
+                    <a:lumMod val="75000"/>
+                  </a:schemeClr>
+                </a:solidFill>
+              </a:rPr>
+              <a:t>Fishing</a:t>
+            </a:r>
+            <a:r>
+              <a:rPr lang="en-US" dirty="0" smtClean="0"/>
+              <a:t> &amp; </a:t>
+            </a:r>
+            <a:r>
+              <a:rPr lang="en-US" b="1" dirty="0" smtClean="0">
+                <a:solidFill>
+                  <a:srgbClr val="FFC000"/>
+                </a:solidFill>
+              </a:rPr>
+              <a:t>Mining</a:t>
+            </a:r>
+            <a:endParaRPr lang="en-US" b="1" dirty="0">
+              <a:solidFill>
+                <a:srgbClr val="FFC000"/>
+              </a:solidFill>
+            </a:endParaRPr>
           </a:p>
         </p:txBody>
       </p:sp>
     </p:spTree>
     <p:extLst>
       <p:ext uri="{BB962C8B-B14F-4D97-AF65-F5344CB8AC3E}">
-        <p14:creationId xmlns:p14="http://schemas.microsoft.com/office/powerpoint/2010/main" val="378134169"/>
+        <p14:creationId xmlns:p14="http://schemas.microsoft.com/office/powerpoint/2010/main" val="145346424"/>
       </p:ext>
     </p:extLst>
   </p:cSld>
@@ -5674,35 +7305,577 @@
           <a:p>
             <a:r>
               <a:rPr lang="en-US" dirty="0" smtClean="0"/>
-              <a:t>Conclusions and Next Steps</a:t>
+              <a:t>Modification 1: Spatial</a:t>
             </a:r>
             <a:endParaRPr lang="en-US" dirty="0"/>
           </a:p>
         </p:txBody>
       </p:sp>
-      <p:sp>
-        <p:nvSpPr>
-          <p:cNvPr id="3" name="Content Placeholder 2"/>
-          <p:cNvSpPr>
-            <a:spLocks noGrp="1"/>
-          </p:cNvSpPr>
-          <p:nvPr>
-            <p:ph idx="1"/>
-          </p:nvPr>
-        </p:nvSpPr>
-        <p:spPr/>
-        <p:txBody>
-          <a:bodyPr/>
-          <a:lstStyle/>
-          <a:p>
-            <a:endParaRPr lang="en-US"/>
+      <p:pic>
+        <p:nvPicPr>
+          <p:cNvPr id="4" name="Picture 3"/>
+          <p:cNvPicPr>
+            <a:picLocks noChangeAspect="1"/>
+          </p:cNvPicPr>
+          <p:nvPr/>
+        </p:nvPicPr>
+        <p:blipFill rotWithShape="1">
+          <a:blip r:embed="rId2"/>
+          <a:srcRect l="3901"/>
+          <a:stretch/>
+        </p:blipFill>
+        <p:spPr>
+          <a:xfrm>
+            <a:off x="838200" y="1581504"/>
+            <a:ext cx="4230806" cy="4320095"/>
+          </a:xfrm>
+          <a:prstGeom prst="rect">
+            <a:avLst/>
+          </a:prstGeom>
+        </p:spPr>
+      </p:pic>
+      <p:pic>
+        <p:nvPicPr>
+          <p:cNvPr id="8" name="Picture 7"/>
+          <p:cNvPicPr>
+            <a:picLocks noChangeAspect="1"/>
+          </p:cNvPicPr>
+          <p:nvPr/>
+        </p:nvPicPr>
+        <p:blipFill>
+          <a:blip r:embed="rId3"/>
+          <a:stretch>
+            <a:fillRect/>
+          </a:stretch>
+        </p:blipFill>
+        <p:spPr>
+          <a:xfrm>
+            <a:off x="5444888" y="1581504"/>
+            <a:ext cx="2825656" cy="645864"/>
+          </a:xfrm>
+          <a:prstGeom prst="rect">
+            <a:avLst/>
+          </a:prstGeom>
+        </p:spPr>
+      </p:pic>
+      <p:sp>
+        <p:nvSpPr>
+          <p:cNvPr id="9" name="TextBox 8"/>
+          <p:cNvSpPr txBox="1"/>
+          <p:nvPr/>
+        </p:nvSpPr>
+        <p:spPr>
+          <a:xfrm>
+            <a:off x="8646426" y="1579403"/>
+            <a:ext cx="3008763" cy="646331"/>
+          </a:xfrm>
+          <a:prstGeom prst="rect">
+            <a:avLst/>
+          </a:prstGeom>
+          <a:noFill/>
+        </p:spPr>
+        <p:txBody>
+          <a:bodyPr wrap="square" rtlCol="0">
+            <a:spAutoFit/>
+          </a:bodyPr>
+          <a:lstStyle/>
+          <a:p>
+            <a:r>
+              <a:rPr lang="en-US" dirty="0" smtClean="0"/>
+              <a:t>What percentage of the world does a turtle learn from?</a:t>
+            </a:r>
+            <a:endParaRPr lang="en-US" dirty="0"/>
+          </a:p>
+        </p:txBody>
+      </p:sp>
+      <p:pic>
+        <p:nvPicPr>
+          <p:cNvPr id="3" name="Picture 2"/>
+          <p:cNvPicPr>
+            <a:picLocks noChangeAspect="1"/>
+          </p:cNvPicPr>
+          <p:nvPr/>
+        </p:nvPicPr>
+        <p:blipFill rotWithShape="1">
+          <a:blip r:embed="rId4"/>
+          <a:srcRect l="4369"/>
+          <a:stretch/>
+        </p:blipFill>
+        <p:spPr>
+          <a:xfrm>
+            <a:off x="5568286" y="2907067"/>
+            <a:ext cx="2103554" cy="607800"/>
+          </a:xfrm>
+          <a:prstGeom prst="rect">
+            <a:avLst/>
+          </a:prstGeom>
+        </p:spPr>
+      </p:pic>
+      <p:sp>
+        <p:nvSpPr>
+          <p:cNvPr id="10" name="TextBox 9"/>
+          <p:cNvSpPr txBox="1"/>
+          <p:nvPr/>
+        </p:nvSpPr>
+        <p:spPr>
+          <a:xfrm>
+            <a:off x="7925369" y="2868536"/>
+            <a:ext cx="3008763" cy="646331"/>
+          </a:xfrm>
+          <a:prstGeom prst="rect">
+            <a:avLst/>
+          </a:prstGeom>
+          <a:noFill/>
+        </p:spPr>
+        <p:txBody>
+          <a:bodyPr wrap="square" rtlCol="0">
+            <a:spAutoFit/>
+          </a:bodyPr>
+          <a:lstStyle/>
+          <a:p>
+            <a:r>
+              <a:rPr lang="en-US" dirty="0" smtClean="0"/>
+              <a:t>How fast do turtles move around the world?</a:t>
+            </a:r>
+            <a:endParaRPr lang="en-US" dirty="0"/>
+          </a:p>
+        </p:txBody>
+      </p:sp>
+      <p:sp>
+        <p:nvSpPr>
+          <p:cNvPr id="13" name="TextBox 12"/>
+          <p:cNvSpPr txBox="1"/>
+          <p:nvPr/>
+        </p:nvSpPr>
+        <p:spPr>
+          <a:xfrm>
+            <a:off x="838200" y="5901599"/>
+            <a:ext cx="3452884" cy="369332"/>
+          </a:xfrm>
+          <a:prstGeom prst="rect">
+            <a:avLst/>
+          </a:prstGeom>
+          <a:noFill/>
+        </p:spPr>
+        <p:txBody>
+          <a:bodyPr wrap="square" rtlCol="0">
+            <a:spAutoFit/>
+          </a:bodyPr>
+          <a:lstStyle/>
+          <a:p>
+            <a:r>
+              <a:rPr lang="en-US" dirty="0"/>
+              <a:t> </a:t>
+            </a:r>
+            <a:r>
+              <a:rPr lang="en-US" dirty="0" smtClean="0"/>
+              <a:t>           Spatially Distributed Agents</a:t>
+            </a:r>
+            <a:endParaRPr lang="en-US" dirty="0"/>
+          </a:p>
+        </p:txBody>
+      </p:sp>
+      <p:sp>
+        <p:nvSpPr>
+          <p:cNvPr id="14" name="TextBox 13"/>
+          <p:cNvSpPr txBox="1"/>
+          <p:nvPr/>
+        </p:nvSpPr>
+        <p:spPr>
+          <a:xfrm>
+            <a:off x="1834486" y="6270931"/>
+            <a:ext cx="2238233" cy="369332"/>
+          </a:xfrm>
+          <a:prstGeom prst="rect">
+            <a:avLst/>
+          </a:prstGeom>
+          <a:noFill/>
+        </p:spPr>
+        <p:txBody>
+          <a:bodyPr wrap="square" rtlCol="0">
+            <a:spAutoFit/>
+          </a:bodyPr>
+          <a:lstStyle/>
+          <a:p>
+            <a:r>
+              <a:rPr lang="en-US" b="1" dirty="0" smtClean="0">
+                <a:solidFill>
+                  <a:schemeClr val="accent1">
+                    <a:lumMod val="75000"/>
+                  </a:schemeClr>
+                </a:solidFill>
+              </a:rPr>
+              <a:t>Fishing</a:t>
+            </a:r>
+            <a:r>
+              <a:rPr lang="en-US" dirty="0" smtClean="0"/>
+              <a:t> &amp; </a:t>
+            </a:r>
+            <a:r>
+              <a:rPr lang="en-US" b="1" dirty="0" smtClean="0">
+                <a:solidFill>
+                  <a:srgbClr val="FFC000"/>
+                </a:solidFill>
+              </a:rPr>
+              <a:t>Mining</a:t>
+            </a:r>
+            <a:endParaRPr lang="en-US" b="1" dirty="0">
+              <a:solidFill>
+                <a:srgbClr val="FFC000"/>
+              </a:solidFill>
+            </a:endParaRPr>
           </a:p>
         </p:txBody>
       </p:sp>
     </p:spTree>
     <p:extLst>
       <p:ext uri="{BB962C8B-B14F-4D97-AF65-F5344CB8AC3E}">
-        <p14:creationId xmlns:p14="http://schemas.microsoft.com/office/powerpoint/2010/main" val="896866910"/>
+        <p14:creationId xmlns:p14="http://schemas.microsoft.com/office/powerpoint/2010/main" val="530709096"/>
+      </p:ext>
+    </p:extLst>
+  </p:cSld>
+  <p:clrMapOvr>
+    <a:masterClrMapping/>
+  </p:clrMapOvr>
+</p:sld>
+</file>
+
+<file path=ppt/slides/slide9.xml><?xml version="1.0" encoding="utf-8"?>
+<p:sld xmlns:a="http://schemas.openxmlformats.org/drawingml/2006/main" xmlns:r="http://schemas.openxmlformats.org/officeDocument/2006/relationships" xmlns:p="http://schemas.openxmlformats.org/presentationml/2006/main">
+  <p:cSld>
+    <p:spTree>
+      <p:nvGrpSpPr>
+        <p:cNvPr id="1" name=""/>
+        <p:cNvGrpSpPr/>
+        <p:nvPr/>
+      </p:nvGrpSpPr>
+      <p:grpSpPr>
+        <a:xfrm>
+          <a:off x="0" y="0"/>
+          <a:ext cx="0" cy="0"/>
+          <a:chOff x="0" y="0"/>
+          <a:chExt cx="0" cy="0"/>
+        </a:xfrm>
+      </p:grpSpPr>
+      <p:sp>
+        <p:nvSpPr>
+          <p:cNvPr id="2" name="Title 1"/>
+          <p:cNvSpPr>
+            <a:spLocks noGrp="1"/>
+          </p:cNvSpPr>
+          <p:nvPr>
+            <p:ph type="title"/>
+          </p:nvPr>
+        </p:nvSpPr>
+        <p:spPr/>
+        <p:txBody>
+          <a:bodyPr/>
+          <a:lstStyle/>
+          <a:p>
+            <a:r>
+              <a:rPr lang="en-US" dirty="0" smtClean="0"/>
+              <a:t>Modification 1: Spatial</a:t>
+            </a:r>
+            <a:endParaRPr lang="en-US" dirty="0"/>
+          </a:p>
+        </p:txBody>
+      </p:sp>
+      <p:pic>
+        <p:nvPicPr>
+          <p:cNvPr id="4" name="Picture 3"/>
+          <p:cNvPicPr>
+            <a:picLocks noChangeAspect="1"/>
+          </p:cNvPicPr>
+          <p:nvPr/>
+        </p:nvPicPr>
+        <p:blipFill rotWithShape="1">
+          <a:blip r:embed="rId2"/>
+          <a:srcRect l="3901"/>
+          <a:stretch/>
+        </p:blipFill>
+        <p:spPr>
+          <a:xfrm>
+            <a:off x="838200" y="1581504"/>
+            <a:ext cx="4230806" cy="4320095"/>
+          </a:xfrm>
+          <a:prstGeom prst="rect">
+            <a:avLst/>
+          </a:prstGeom>
+        </p:spPr>
+      </p:pic>
+      <p:pic>
+        <p:nvPicPr>
+          <p:cNvPr id="8" name="Picture 7"/>
+          <p:cNvPicPr>
+            <a:picLocks noChangeAspect="1"/>
+          </p:cNvPicPr>
+          <p:nvPr/>
+        </p:nvPicPr>
+        <p:blipFill>
+          <a:blip r:embed="rId3"/>
+          <a:stretch>
+            <a:fillRect/>
+          </a:stretch>
+        </p:blipFill>
+        <p:spPr>
+          <a:xfrm>
+            <a:off x="5444888" y="1581504"/>
+            <a:ext cx="2825656" cy="645864"/>
+          </a:xfrm>
+          <a:prstGeom prst="rect">
+            <a:avLst/>
+          </a:prstGeom>
+        </p:spPr>
+      </p:pic>
+      <p:sp>
+        <p:nvSpPr>
+          <p:cNvPr id="9" name="TextBox 8"/>
+          <p:cNvSpPr txBox="1"/>
+          <p:nvPr/>
+        </p:nvSpPr>
+        <p:spPr>
+          <a:xfrm>
+            <a:off x="8646426" y="1579403"/>
+            <a:ext cx="3008763" cy="646331"/>
+          </a:xfrm>
+          <a:prstGeom prst="rect">
+            <a:avLst/>
+          </a:prstGeom>
+          <a:noFill/>
+        </p:spPr>
+        <p:txBody>
+          <a:bodyPr wrap="square" rtlCol="0">
+            <a:spAutoFit/>
+          </a:bodyPr>
+          <a:lstStyle/>
+          <a:p>
+            <a:r>
+              <a:rPr lang="en-US" dirty="0" smtClean="0"/>
+              <a:t>What percentage of the world does a turtle learn from?</a:t>
+            </a:r>
+            <a:endParaRPr lang="en-US" dirty="0"/>
+          </a:p>
+        </p:txBody>
+      </p:sp>
+      <p:pic>
+        <p:nvPicPr>
+          <p:cNvPr id="3" name="Picture 2"/>
+          <p:cNvPicPr>
+            <a:picLocks noChangeAspect="1"/>
+          </p:cNvPicPr>
+          <p:nvPr/>
+        </p:nvPicPr>
+        <p:blipFill rotWithShape="1">
+          <a:blip r:embed="rId4"/>
+          <a:srcRect l="4369"/>
+          <a:stretch/>
+        </p:blipFill>
+        <p:spPr>
+          <a:xfrm>
+            <a:off x="5568286" y="2907067"/>
+            <a:ext cx="2103554" cy="607800"/>
+          </a:xfrm>
+          <a:prstGeom prst="rect">
+            <a:avLst/>
+          </a:prstGeom>
+        </p:spPr>
+      </p:pic>
+      <p:sp>
+        <p:nvSpPr>
+          <p:cNvPr id="10" name="TextBox 9"/>
+          <p:cNvSpPr txBox="1"/>
+          <p:nvPr/>
+        </p:nvSpPr>
+        <p:spPr>
+          <a:xfrm>
+            <a:off x="7925369" y="2868536"/>
+            <a:ext cx="3008763" cy="646331"/>
+          </a:xfrm>
+          <a:prstGeom prst="rect">
+            <a:avLst/>
+          </a:prstGeom>
+          <a:noFill/>
+        </p:spPr>
+        <p:txBody>
+          <a:bodyPr wrap="square" rtlCol="0">
+            <a:spAutoFit/>
+          </a:bodyPr>
+          <a:lstStyle/>
+          <a:p>
+            <a:r>
+              <a:rPr lang="en-US" dirty="0" smtClean="0"/>
+              <a:t>How fast do turtles move around the world?</a:t>
+            </a:r>
+            <a:endParaRPr lang="en-US" dirty="0"/>
+          </a:p>
+        </p:txBody>
+      </p:sp>
+      <p:pic>
+        <p:nvPicPr>
+          <p:cNvPr id="6" name="Picture 5"/>
+          <p:cNvPicPr>
+            <a:picLocks noChangeAspect="1"/>
+          </p:cNvPicPr>
+          <p:nvPr/>
+        </p:nvPicPr>
+        <p:blipFill rotWithShape="1">
+          <a:blip r:embed="rId5"/>
+          <a:srcRect t="14957" b="10795"/>
+          <a:stretch/>
+        </p:blipFill>
+        <p:spPr>
+          <a:xfrm>
+            <a:off x="5568286" y="4094328"/>
+            <a:ext cx="1498600" cy="518616"/>
+          </a:xfrm>
+          <a:prstGeom prst="rect">
+            <a:avLst/>
+          </a:prstGeom>
+        </p:spPr>
+      </p:pic>
+      <p:sp>
+        <p:nvSpPr>
+          <p:cNvPr id="11" name="TextBox 10"/>
+          <p:cNvSpPr txBox="1"/>
+          <p:nvPr/>
+        </p:nvSpPr>
+        <p:spPr>
+          <a:xfrm>
+            <a:off x="7566166" y="4046384"/>
+            <a:ext cx="3008763" cy="646331"/>
+          </a:xfrm>
+          <a:prstGeom prst="rect">
+            <a:avLst/>
+          </a:prstGeom>
+          <a:noFill/>
+        </p:spPr>
+        <p:txBody>
+          <a:bodyPr wrap="square" rtlCol="0">
+            <a:spAutoFit/>
+          </a:bodyPr>
+          <a:lstStyle/>
+          <a:p>
+            <a:r>
+              <a:rPr lang="en-US" dirty="0" smtClean="0"/>
+              <a:t>Turtles move towards similar others re: fishing and mining</a:t>
+            </a:r>
+            <a:endParaRPr lang="en-US" dirty="0"/>
+          </a:p>
+        </p:txBody>
+      </p:sp>
+      <p:pic>
+        <p:nvPicPr>
+          <p:cNvPr id="12" name="Picture 11"/>
+          <p:cNvPicPr>
+            <a:picLocks noChangeAspect="1"/>
+          </p:cNvPicPr>
+          <p:nvPr/>
+        </p:nvPicPr>
+        <p:blipFill rotWithShape="1">
+          <a:blip r:embed="rId6"/>
+          <a:srcRect l="2610"/>
+          <a:stretch/>
+        </p:blipFill>
+        <p:spPr>
+          <a:xfrm>
+            <a:off x="838199" y="1657137"/>
+            <a:ext cx="4133669" cy="4244462"/>
+          </a:xfrm>
+          <a:prstGeom prst="rect">
+            <a:avLst/>
+          </a:prstGeom>
+        </p:spPr>
+      </p:pic>
+      <p:sp>
+        <p:nvSpPr>
+          <p:cNvPr id="13" name="TextBox 12"/>
+          <p:cNvSpPr txBox="1"/>
+          <p:nvPr/>
+        </p:nvSpPr>
+        <p:spPr>
+          <a:xfrm>
+            <a:off x="838200" y="5901599"/>
+            <a:ext cx="3452884" cy="369332"/>
+          </a:xfrm>
+          <a:prstGeom prst="rect">
+            <a:avLst/>
+          </a:prstGeom>
+          <a:noFill/>
+        </p:spPr>
+        <p:txBody>
+          <a:bodyPr wrap="square" rtlCol="0">
+            <a:spAutoFit/>
+          </a:bodyPr>
+          <a:lstStyle/>
+          <a:p>
+            <a:r>
+              <a:rPr lang="en-US" dirty="0"/>
+              <a:t> </a:t>
+            </a:r>
+            <a:r>
+              <a:rPr lang="en-US" dirty="0" smtClean="0"/>
+              <a:t>           Spatially Distributed Agents</a:t>
+            </a:r>
+            <a:endParaRPr lang="en-US" dirty="0"/>
+          </a:p>
+        </p:txBody>
+      </p:sp>
+      <p:sp>
+        <p:nvSpPr>
+          <p:cNvPr id="14" name="TextBox 13"/>
+          <p:cNvSpPr txBox="1"/>
+          <p:nvPr/>
+        </p:nvSpPr>
+        <p:spPr>
+          <a:xfrm>
+            <a:off x="1834486" y="6270931"/>
+            <a:ext cx="2238233" cy="369332"/>
+          </a:xfrm>
+          <a:prstGeom prst="rect">
+            <a:avLst/>
+          </a:prstGeom>
+          <a:noFill/>
+        </p:spPr>
+        <p:txBody>
+          <a:bodyPr wrap="square" rtlCol="0">
+            <a:spAutoFit/>
+          </a:bodyPr>
+          <a:lstStyle/>
+          <a:p>
+            <a:r>
+              <a:rPr lang="en-US" b="1" dirty="0" smtClean="0">
+                <a:solidFill>
+                  <a:schemeClr val="accent1">
+                    <a:lumMod val="75000"/>
+                  </a:schemeClr>
+                </a:solidFill>
+              </a:rPr>
+              <a:t>Fishing</a:t>
+            </a:r>
+            <a:r>
+              <a:rPr lang="en-US" dirty="0" smtClean="0"/>
+              <a:t> &amp; </a:t>
+            </a:r>
+            <a:r>
+              <a:rPr lang="en-US" b="1" dirty="0" smtClean="0">
+                <a:solidFill>
+                  <a:srgbClr val="FFC000"/>
+                </a:solidFill>
+              </a:rPr>
+              <a:t>Mining</a:t>
+            </a:r>
+            <a:endParaRPr lang="en-US" b="1" dirty="0">
+              <a:solidFill>
+                <a:srgbClr val="FFC000"/>
+              </a:solidFill>
+            </a:endParaRPr>
+          </a:p>
+        </p:txBody>
+      </p:sp>
+    </p:spTree>
+    <p:extLst>
+      <p:ext uri="{BB962C8B-B14F-4D97-AF65-F5344CB8AC3E}">
+        <p14:creationId xmlns:p14="http://schemas.microsoft.com/office/powerpoint/2010/main" val="1797607855"/>
       </p:ext>
     </p:extLst>
   </p:cSld>

</xml_diff>

<commit_message>
add changes to ppt
</commit_message>
<xml_diff>
--- a/Lakeland Presentation.pptx
+++ b/Lakeland Presentation.pptx
@@ -21,8 +21,8 @@
     <p:sldId id="275" r:id="rId12"/>
     <p:sldId id="276" r:id="rId13"/>
     <p:sldId id="267" r:id="rId14"/>
-    <p:sldId id="268" r:id="rId15"/>
-    <p:sldId id="277" r:id="rId16"/>
+    <p:sldId id="277" r:id="rId15"/>
+    <p:sldId id="280" r:id="rId16"/>
     <p:sldId id="278" r:id="rId17"/>
     <p:sldId id="279" r:id="rId18"/>
     <p:sldId id="269" r:id="rId19"/>
@@ -4077,31 +4077,25 @@
           <a:p>
             <a:r>
               <a:rPr lang="en-US" dirty="0" smtClean="0"/>
-              <a:t>Experiment 1: Neighborhood</a:t>
+              <a:t>Experiment 1: Neighborhoods with Movement</a:t>
             </a:r>
           </a:p>
           <a:p>
             <a:r>
               <a:rPr lang="en-US" dirty="0" smtClean="0"/>
-              <a:t>Experiment 2: Neighborhoods with Movement</a:t>
+              <a:t>Experiment 2: Neighborhoods with Flocking</a:t>
             </a:r>
           </a:p>
           <a:p>
             <a:r>
               <a:rPr lang="en-US" dirty="0" smtClean="0"/>
-              <a:t>Experiment 3: Neighborhoods with Flocking</a:t>
+              <a:t>Experiment 3: Varying Gamma </a:t>
             </a:r>
           </a:p>
           <a:p>
             <a:r>
               <a:rPr lang="en-US" dirty="0" smtClean="0"/>
-              <a:t>Experiment 4: Vary Gamma </a:t>
-            </a:r>
-          </a:p>
-          <a:p>
-            <a:r>
-              <a:rPr lang="en-US" dirty="0" smtClean="0"/>
-              <a:t>Experiment 5: Variability in Gamma </a:t>
+              <a:t>Experiment 4: Variability in Gamma </a:t>
             </a:r>
           </a:p>
           <a:p>
@@ -4159,39 +4153,62 @@
           <a:p>
             <a:r>
               <a:rPr lang="en-US" dirty="0" smtClean="0"/>
-              <a:t>Experiment 1: Radius</a:t>
+              <a:t>Experiment 1: Neighborhood Size + Speed</a:t>
             </a:r>
             <a:endParaRPr lang="en-US" dirty="0"/>
           </a:p>
         </p:txBody>
       </p:sp>
-      <p:sp>
-        <p:nvSpPr>
-          <p:cNvPr id="3" name="Content Placeholder 2"/>
-          <p:cNvSpPr>
-            <a:spLocks noGrp="1"/>
-          </p:cNvSpPr>
-          <p:nvPr>
-            <p:ph idx="1"/>
-          </p:nvPr>
-        </p:nvSpPr>
-        <p:spPr/>
-        <p:txBody>
-          <a:bodyPr/>
-          <a:lstStyle/>
-          <a:p>
-            <a:r>
-              <a:rPr lang="en-US" dirty="0" smtClean="0"/>
-              <a:t>Impact on behavioral choice </a:t>
-            </a:r>
-            <a:endParaRPr lang="en-US" dirty="0"/>
-          </a:p>
-        </p:txBody>
-      </p:sp>
+      <p:pic>
+        <p:nvPicPr>
+          <p:cNvPr id="5" name="Picture 4"/>
+          <p:cNvPicPr>
+            <a:picLocks noChangeAspect="1"/>
+          </p:cNvPicPr>
+          <p:nvPr/>
+        </p:nvPicPr>
+        <p:blipFill rotWithShape="1">
+          <a:blip r:embed="rId2"/>
+          <a:srcRect l="5351" r="5032"/>
+          <a:stretch/>
+        </p:blipFill>
+        <p:spPr>
+          <a:xfrm>
+            <a:off x="217154" y="1690688"/>
+            <a:ext cx="6026589" cy="5043665"/>
+          </a:xfrm>
+          <a:prstGeom prst="rect">
+            <a:avLst/>
+          </a:prstGeom>
+        </p:spPr>
+      </p:pic>
+      <p:pic>
+        <p:nvPicPr>
+          <p:cNvPr id="6" name="Picture 5"/>
+          <p:cNvPicPr>
+            <a:picLocks noChangeAspect="1"/>
+          </p:cNvPicPr>
+          <p:nvPr/>
+        </p:nvPicPr>
+        <p:blipFill rotWithShape="1">
+          <a:blip r:embed="rId3"/>
+          <a:srcRect l="5351" r="6567"/>
+          <a:stretch/>
+        </p:blipFill>
+        <p:spPr>
+          <a:xfrm>
+            <a:off x="6096000" y="1718914"/>
+            <a:ext cx="5882186" cy="5008615"/>
+          </a:xfrm>
+          <a:prstGeom prst="rect">
+            <a:avLst/>
+          </a:prstGeom>
+        </p:spPr>
+      </p:pic>
     </p:spTree>
     <p:extLst>
       <p:ext uri="{BB962C8B-B14F-4D97-AF65-F5344CB8AC3E}">
-        <p14:creationId xmlns:p14="http://schemas.microsoft.com/office/powerpoint/2010/main" val="378134169"/>
+        <p14:creationId xmlns:p14="http://schemas.microsoft.com/office/powerpoint/2010/main" val="1207222471"/>
       </p:ext>
     </p:extLst>
   </p:cSld>
@@ -4235,39 +4252,19 @@
           <a:p>
             <a:r>
               <a:rPr lang="en-US" dirty="0" smtClean="0"/>
-              <a:t>Experiment 2: Radius + Speed</a:t>
-            </a:r>
-            <a:endParaRPr lang="en-US" dirty="0"/>
-          </a:p>
-        </p:txBody>
-      </p:sp>
-      <p:sp>
-        <p:nvSpPr>
-          <p:cNvPr id="3" name="Content Placeholder 2"/>
-          <p:cNvSpPr>
-            <a:spLocks noGrp="1"/>
-          </p:cNvSpPr>
-          <p:nvPr>
-            <p:ph idx="1"/>
-          </p:nvPr>
-        </p:nvSpPr>
-        <p:spPr/>
-        <p:txBody>
-          <a:bodyPr/>
-          <a:lstStyle/>
-          <a:p>
-            <a:r>
-              <a:rPr lang="en-US" dirty="0" smtClean="0"/>
-              <a:t>Impact on behavioral choice </a:t>
-            </a:r>
-            <a:endParaRPr lang="en-US" dirty="0"/>
+              <a:t>Experiment 1b: </a:t>
+            </a:r>
+            <a:r>
+              <a:rPr lang="en-US" dirty="0"/>
+              <a:t>Neighborhood Size + Speed</a:t>
+            </a:r>
           </a:p>
         </p:txBody>
       </p:sp>
     </p:spTree>
     <p:extLst>
       <p:ext uri="{BB962C8B-B14F-4D97-AF65-F5344CB8AC3E}">
-        <p14:creationId xmlns:p14="http://schemas.microsoft.com/office/powerpoint/2010/main" val="1207222471"/>
+        <p14:creationId xmlns:p14="http://schemas.microsoft.com/office/powerpoint/2010/main" val="940911212"/>
       </p:ext>
     </p:extLst>
   </p:cSld>
@@ -4311,7 +4308,7 @@
           <a:p>
             <a:r>
               <a:rPr lang="en-US" dirty="0" smtClean="0"/>
-              <a:t>Experiment 3: Radius + Speed + Flocking</a:t>
+              <a:t>Experiment 2: Neighborhood + Speed + Flocking</a:t>
             </a:r>
             <a:endParaRPr lang="en-US" dirty="0"/>
           </a:p>

</xml_diff>